<commit_message>
Commit 4 oct 2011
</commit_message>
<xml_diff>
--- a/exo-sysAdmin/910-Intro-XSys-en.pptx
+++ b/exo-sysAdmin/910-Intro-XSys-en.pptx
@@ -7,7 +7,7 @@
     <p:sldMasterId id="2147483650" r:id="rId3"/>
   </p:sldMasterIdLst>
   <p:notesMasterIdLst>
-    <p:notesMasterId r:id="rId32"/>
+    <p:notesMasterId r:id="rId33"/>
   </p:notesMasterIdLst>
   <p:sldIdLst>
     <p:sldId id="256" r:id="rId4"/>
@@ -22,22 +22,23 @@
     <p:sldId id="379" r:id="rId13"/>
     <p:sldId id="380" r:id="rId14"/>
     <p:sldId id="392" r:id="rId15"/>
-    <p:sldId id="393" r:id="rId16"/>
-    <p:sldId id="338" r:id="rId17"/>
-    <p:sldId id="395" r:id="rId18"/>
-    <p:sldId id="399" r:id="rId19"/>
-    <p:sldId id="396" r:id="rId20"/>
-    <p:sldId id="397" r:id="rId21"/>
-    <p:sldId id="398" r:id="rId22"/>
-    <p:sldId id="400" r:id="rId23"/>
-    <p:sldId id="401" r:id="rId24"/>
-    <p:sldId id="402" r:id="rId25"/>
-    <p:sldId id="408" r:id="rId26"/>
-    <p:sldId id="409" r:id="rId27"/>
-    <p:sldId id="410" r:id="rId28"/>
-    <p:sldId id="411" r:id="rId29"/>
-    <p:sldId id="412" r:id="rId30"/>
-    <p:sldId id="394" r:id="rId31"/>
+    <p:sldId id="415" r:id="rId16"/>
+    <p:sldId id="393" r:id="rId17"/>
+    <p:sldId id="338" r:id="rId18"/>
+    <p:sldId id="395" r:id="rId19"/>
+    <p:sldId id="399" r:id="rId20"/>
+    <p:sldId id="396" r:id="rId21"/>
+    <p:sldId id="397" r:id="rId22"/>
+    <p:sldId id="398" r:id="rId23"/>
+    <p:sldId id="400" r:id="rId24"/>
+    <p:sldId id="401" r:id="rId25"/>
+    <p:sldId id="402" r:id="rId26"/>
+    <p:sldId id="408" r:id="rId27"/>
+    <p:sldId id="409" r:id="rId28"/>
+    <p:sldId id="410" r:id="rId29"/>
+    <p:sldId id="411" r:id="rId30"/>
+    <p:sldId id="412" r:id="rId31"/>
+    <p:sldId id="394" r:id="rId32"/>
   </p:sldIdLst>
   <p:sldSz cx="11160125" cy="7559675"/>
   <p:notesSz cx="7772400" cy="10058400"/>
@@ -2116,7 +2117,7 @@
             <a:fld id="{24266FFD-7EDA-49C8-88B2-0F0ACA6EE776}" type="slidenum">
               <a:rPr lang="en-GB"/>
               <a:pPr/>
-              <a:t>14</a:t>
+              <a:t>15</a:t>
             </a:fld>
             <a:endParaRPr lang="en-GB"/>
           </a:p>
@@ -2219,7 +2220,7 @@
                   <a:tab pos="9144000" algn="l"/>
                 </a:tabLst>
               </a:pPr>
-              <a:t>14</a:t>
+              <a:t>15</a:t>
             </a:fld>
             <a:endParaRPr lang="en-GB" sz="1400">
               <a:solidFill>
@@ -2353,7 +2354,7 @@
                 </a:solidFill>
               </a:rPr>
               <a:pPr/>
-              <a:t>23</a:t>
+              <a:t>24</a:t>
             </a:fld>
             <a:endParaRPr lang="en-GB">
               <a:solidFill>
@@ -2460,7 +2461,7 @@
                   <a:tab pos="9144000" algn="l"/>
                 </a:tabLst>
               </a:pPr>
-              <a:t>23</a:t>
+              <a:t>24</a:t>
             </a:fld>
             <a:endParaRPr lang="en-GB" sz="1400">
               <a:solidFill>
@@ -2594,7 +2595,7 @@
             <a:fld id="{43F345E1-DE08-49C4-9805-072619C6BD24}" type="slidenum">
               <a:rPr lang="en-GB"/>
               <a:pPr/>
-              <a:t>28</a:t>
+              <a:t>29</a:t>
             </a:fld>
             <a:endParaRPr lang="en-GB"/>
           </a:p>
@@ -2697,7 +2698,7 @@
                   <a:tab pos="9144000" algn="l"/>
                 </a:tabLst>
               </a:pPr>
-              <a:t>28</a:t>
+              <a:t>29</a:t>
             </a:fld>
             <a:endParaRPr lang="en-GB" sz="1400">
               <a:solidFill>
@@ -19013,12 +19014,8 @@
               </a:tabLst>
             </a:pPr>
             <a:r>
-              <a:rPr lang="en-US" sz="4800" dirty="0" err="1" smtClean="0"/>
-              <a:t>eXo</a:t>
-            </a:r>
-            <a:r>
               <a:rPr lang="en-US" sz="4800" dirty="0" smtClean="0"/>
-              <a:t> </a:t>
+              <a:t>eXo </a:t>
             </a:r>
             <a:r>
               <a:rPr lang="en-US" sz="4800" dirty="0" err="1" smtClean="0"/>
@@ -19114,15 +19111,7 @@
             <a:pPr eaLnBrk="1" hangingPunct="1"/>
             <a:r>
               <a:rPr lang="en-US" dirty="0" smtClean="0"/>
-              <a:t>Installing </a:t>
-            </a:r>
-            <a:r>
-              <a:rPr lang="en-US" dirty="0" err="1" smtClean="0"/>
-              <a:t>eXo</a:t>
-            </a:r>
-            <a:r>
-              <a:rPr lang="en-US" dirty="0" smtClean="0"/>
-              <a:t> Platform on Tomcat</a:t>
+              <a:t>Installing eXo Platform on Tomcat</a:t>
             </a:r>
           </a:p>
         </p:txBody>
@@ -19150,10 +19139,7 @@
             <a:pPr marL="219361" indent="-216749">
               <a:buNone/>
             </a:pPr>
-            <a:r>
-              <a:rPr lang="en-US" dirty="0" smtClean="0"/>
-              <a:t>Copy</a:t>
-            </a:r>
+            <a:endParaRPr lang="en-US" dirty="0" smtClean="0"/>
           </a:p>
           <a:p>
             <a:pPr marL="584962" lvl="1" indent="-219361"/>
@@ -19162,30 +19148,56 @@
               <a:t>Ready</a:t>
             </a:r>
             <a:r>
+              <a:rPr lang="en-US" dirty="0" smtClean="0"/>
+              <a:t>-to-use package </a:t>
+            </a:r>
+            <a:r>
               <a:rPr lang="en-US" dirty="0"/>
-              <a:t>-made package on top of Tomcat 6 application </a:t>
+              <a:t>on top of Tomcat 6 application </a:t>
             </a:r>
             <a:r>
               <a:rPr lang="en-US" dirty="0" smtClean="0"/>
-              <a:t>server</a:t>
+              <a:t>server:</a:t>
             </a:r>
           </a:p>
           <a:p>
             <a:pPr marL="584962" lvl="1" indent="-219361"/>
+            <a:endParaRPr lang="en-US" dirty="0" smtClean="0"/>
+          </a:p>
+          <a:p>
+            <a:pPr marL="822801" lvl="1" indent="-457200">
+              <a:buFont typeface="+mj-lt"/>
+              <a:buAutoNum type="arabicParenR"/>
+            </a:pPr>
             <a:r>
               <a:rPr lang="en-US" dirty="0" smtClean="0"/>
-              <a:t>Unzip the package</a:t>
-            </a:r>
-          </a:p>
-          <a:p>
-            <a:pPr marL="584962" lvl="1" indent="-219361"/>
+              <a:t>Unzip </a:t>
+            </a:r>
             <a:r>
               <a:rPr lang="en-US" dirty="0" smtClean="0"/>
-              <a:t>copy </a:t>
+              <a:t>the package</a:t>
+            </a:r>
+          </a:p>
+          <a:p>
+            <a:pPr marL="822801" lvl="1" indent="-457200">
+              <a:buFont typeface="+mj-lt"/>
+              <a:buAutoNum type="arabicParenR"/>
+            </a:pPr>
+            <a:r>
+              <a:rPr lang="en-US" dirty="0" smtClean="0"/>
+              <a:t>Copy </a:t>
             </a:r>
             <a:r>
               <a:rPr lang="en-US" dirty="0"/>
-              <a:t>the bin/tomcat6-bundle/ directory to your </a:t>
+              <a:t>the bin/tomcat6-bundle/ </a:t>
+            </a:r>
+            <a:r>
+              <a:rPr lang="en-US" dirty="0" smtClean="0"/>
+              <a:t>folder to </a:t>
+            </a:r>
+            <a:r>
+              <a:rPr lang="en-US" dirty="0"/>
+              <a:t>your </a:t>
             </a:r>
             <a:r>
               <a:rPr lang="en-US" dirty="0" smtClean="0"/>
@@ -19345,7 +19357,7 @@
             </a:r>
             <a:r>
               <a:rPr lang="en-US" dirty="0" smtClean="0"/>
-              <a:t>372470 </a:t>
+              <a:t>374270 </a:t>
             </a:r>
             <a:r>
               <a:rPr lang="en-US" dirty="0" err="1" smtClean="0"/>
@@ -19374,8 +19386,12 @@
               <a:t>Linux or OS X: $TOMCAT_HOME/</a:t>
             </a:r>
             <a:r>
-              <a:rPr lang="en-US" dirty="0" err="1"/>
+              <a:rPr lang="en-US" dirty="0" err="1" smtClean="0"/>
               <a:t>stop_eXo.sh</a:t>
+            </a:r>
+            <a:r>
+              <a:rPr lang="en-US" dirty="0" smtClean="0"/>
+              <a:t> -force</a:t>
             </a:r>
             <a:endParaRPr lang="en-US" dirty="0"/>
           </a:p>
@@ -19421,11 +19437,15 @@
             <a:pPr marL="584962" lvl="1" indent="-219361"/>
             <a:r>
               <a:rPr lang="en-US" dirty="0" smtClean="0"/>
-              <a:t>If problems: CTRL-C or on Windows</a:t>
+              <a:t>If problems: CTRL-C or on </a:t>
+            </a:r>
+            <a:r>
+              <a:rPr lang="en-US" dirty="0" smtClean="0"/>
+              <a:t>Linux: </a:t>
             </a:r>
             <a:r>
               <a:rPr lang="en-US" dirty="0"/>
-              <a:t>: kill -9 (or </a:t>
+              <a:t>kill -9 (or </a:t>
             </a:r>
             <a:r>
               <a:rPr lang="en-US" dirty="0" err="1"/>
@@ -19508,12 +19528,8 @@
           <a:p>
             <a:pPr eaLnBrk="1" hangingPunct="1"/>
             <a:r>
-              <a:rPr lang="en-US" dirty="0" err="1" smtClean="0"/>
-              <a:t>eXo</a:t>
-            </a:r>
-            <a:r>
               <a:rPr lang="en-US" dirty="0" smtClean="0"/>
-              <a:t> Platform Developer JVM Options</a:t>
+              <a:t>eXo Platform Developer JVM Options</a:t>
             </a:r>
           </a:p>
         </p:txBody>
@@ -19696,46 +19712,13 @@
             </a:r>
             <a:r>
               <a:rPr lang="en-US" i="0" dirty="0" smtClean="0"/>
-              <a:t>clipse).</a:t>
-            </a:r>
-          </a:p>
-          <a:p>
-            <a:pPr marL="584962" lvl="1" indent="-219361">
-              <a:lnSpc>
-                <a:spcPct val="100000"/>
-              </a:lnSpc>
-            </a:pPr>
-            <a:r>
-              <a:rPr lang="en-US" i="0" dirty="0"/>
-              <a:t>JMX_AGENT="-</a:t>
-            </a:r>
-            <a:r>
-              <a:rPr lang="en-US" i="0" dirty="0" err="1" smtClean="0"/>
-              <a:t>Dcom.sun.management.jmxremote</a:t>
+              <a:t>clipse)</a:t>
             </a:r>
             <a:r>
               <a:rPr lang="en-US" i="0" dirty="0" smtClean="0"/>
-              <a:t>”</a:t>
-            </a:r>
-            <a:r>
-              <a:rPr lang="en-US" i="0" dirty="0"/>
-              <a:t/>
-            </a:r>
-            <a:br>
-              <a:rPr lang="en-US" i="0" dirty="0"/>
-            </a:br>
-            <a:r>
-              <a:rPr lang="en-US" i="0" dirty="0"/>
-              <a:t>A</a:t>
-            </a:r>
-            <a:r>
-              <a:rPr lang="en-US" i="0" dirty="0" smtClean="0"/>
-              <a:t>ctivates </a:t>
-            </a:r>
-            <a:r>
-              <a:rPr lang="en-US" i="0" dirty="0"/>
-              <a:t>remote JMX monitoring</a:t>
-            </a:r>
+              <a:t>.</a:t>
+            </a:r>
+            <a:endParaRPr lang="en-US" i="0" dirty="0" smtClean="0"/>
           </a:p>
         </p:txBody>
       </p:sp>
@@ -19800,15 +19783,219 @@
             <a:pPr eaLnBrk="1" hangingPunct="1"/>
             <a:r>
               <a:rPr lang="en-US" dirty="0" smtClean="0"/>
-              <a:t>Start </a:t>
-            </a:r>
-            <a:r>
-              <a:rPr lang="en-US" dirty="0" err="1" smtClean="0"/>
-              <a:t>eXo</a:t>
-            </a:r>
+              <a:t>JMX Enabling</a:t>
+            </a:r>
+            <a:endParaRPr lang="en-US" dirty="0" smtClean="0"/>
+          </a:p>
+        </p:txBody>
+      </p:sp>
+      <p:sp>
+        <p:nvSpPr>
+          <p:cNvPr id="16387" name="Rectangle 2"/>
+          <p:cNvSpPr>
+            <a:spLocks noGrp="1" noChangeArrowheads="1"/>
+          </p:cNvSpPr>
+          <p:nvPr>
+            <p:ph type="body" idx="1"/>
+          </p:nvPr>
+        </p:nvSpPr>
+        <p:spPr>
+          <a:xfrm>
+            <a:off x="507964" y="1279507"/>
+            <a:ext cx="10179255" cy="5089000"/>
+          </a:xfrm>
+        </p:spPr>
+        <p:txBody>
+          <a:bodyPr rIns="41783"/>
+          <a:lstStyle/>
+          <a:p>
+            <a:pPr marL="219361" indent="-216749">
+              <a:lnSpc>
+                <a:spcPct val="100000"/>
+              </a:lnSpc>
+              <a:buNone/>
+            </a:pPr>
+            <a:r>
+              <a:rPr lang="en-US" i="0" dirty="0" smtClean="0"/>
+              <a:t>Options:</a:t>
+            </a:r>
+            <a:endParaRPr lang="en-US" i="0" dirty="0"/>
+          </a:p>
+          <a:p>
+            <a:pPr marL="584962" lvl="1" indent="-219361">
+              <a:lnSpc>
+                <a:spcPct val="100000"/>
+              </a:lnSpc>
+            </a:pPr>
+            <a:r>
+              <a:rPr lang="en-US" i="0" dirty="0"/>
+              <a:t>-</a:t>
+            </a:r>
+            <a:r>
+              <a:rPr lang="en-US" i="0" dirty="0" err="1"/>
+              <a:t>Dcom.sun.management.jmxremote</a:t>
+            </a:r>
+            <a:r>
+              <a:rPr lang="en-US" i="0" dirty="0"/>
+              <a:t>=true </a:t>
+            </a:r>
+            <a:r>
+              <a:rPr lang="en-US" i="0" dirty="0" smtClean="0"/>
+              <a:t/>
+            </a:r>
+            <a:br>
+              <a:rPr lang="en-US" i="0" dirty="0" smtClean="0"/>
+            </a:br>
+            <a:r>
+              <a:rPr lang="en-US" i="0" dirty="0" smtClean="0"/>
+              <a:t>-</a:t>
+            </a:r>
+            <a:r>
+              <a:rPr lang="en-US" i="0" dirty="0" err="1"/>
+              <a:t>Dcom.sun.management.jmxremote.ssl</a:t>
+            </a:r>
+            <a:r>
+              <a:rPr lang="en-US" i="0" dirty="0"/>
+              <a:t>=false </a:t>
+            </a:r>
+            <a:r>
+              <a:rPr lang="en-US" i="0" dirty="0" smtClean="0"/>
+              <a:t/>
+            </a:r>
+            <a:br>
+              <a:rPr lang="en-US" i="0" dirty="0" smtClean="0"/>
+            </a:br>
+            <a:r>
+              <a:rPr lang="en-US" i="0" dirty="0" smtClean="0"/>
+              <a:t>-</a:t>
+            </a:r>
+            <a:r>
+              <a:rPr lang="en-US" i="0" dirty="0" err="1"/>
+              <a:t>Dcom.sun.management.jmxremote.authenticate</a:t>
+            </a:r>
+            <a:r>
+              <a:rPr lang="en-US" i="0" dirty="0"/>
+              <a:t>=false </a:t>
+            </a:r>
+            <a:r>
+              <a:rPr lang="en-US" i="0" dirty="0" smtClean="0"/>
+              <a:t/>
+            </a:r>
+            <a:br>
+              <a:rPr lang="en-US" i="0" dirty="0" smtClean="0"/>
+            </a:br>
+            <a:r>
+              <a:rPr lang="en-US" i="0" dirty="0" smtClean="0"/>
+              <a:t>-</a:t>
+            </a:r>
+            <a:r>
+              <a:rPr lang="en-US" i="0" dirty="0" err="1"/>
+              <a:t>Dcom.sun.management.jmxremote.port</a:t>
+            </a:r>
+            <a:r>
+              <a:rPr lang="en-US" i="0" dirty="0"/>
+              <a:t>=</a:t>
+            </a:r>
+            <a:r>
+              <a:rPr lang="en-US" i="0" dirty="0" smtClean="0"/>
+              <a:t>12345</a:t>
+            </a:r>
+          </a:p>
+          <a:p>
+            <a:pPr marL="584962" lvl="1" indent="-219361">
+              <a:lnSpc>
+                <a:spcPct val="100000"/>
+              </a:lnSpc>
+            </a:pPr>
+            <a:r>
+              <a:rPr lang="en-US" i="0" dirty="0" smtClean="0"/>
+              <a:t>Activates </a:t>
+            </a:r>
+            <a:r>
+              <a:rPr lang="en-US" i="0" dirty="0"/>
+              <a:t>remote JMX </a:t>
+            </a:r>
+            <a:r>
+              <a:rPr lang="en-US" i="0" dirty="0" smtClean="0"/>
+              <a:t>monitoring</a:t>
+            </a:r>
+          </a:p>
+          <a:p>
+            <a:pPr marL="584962" lvl="1" indent="-219361">
+              <a:lnSpc>
+                <a:spcPct val="100000"/>
+              </a:lnSpc>
+            </a:pPr>
+            <a:r>
+              <a:rPr lang="en-US" i="0" dirty="0" smtClean="0"/>
+              <a:t>You can monitor the exposed values and execute the exposed admin methods using an JMX client</a:t>
+            </a:r>
+            <a:endParaRPr lang="en-US" i="0" dirty="0"/>
+          </a:p>
+        </p:txBody>
+      </p:sp>
+    </p:spTree>
+    <p:extLst>
+      <p:ext uri="{BB962C8B-B14F-4D97-AF65-F5344CB8AC3E}">
+        <p14:creationId xmlns:p14="http://schemas.microsoft.com/office/powerpoint/2010/main" val="3316341733"/>
+      </p:ext>
+    </p:extLst>
+  </p:cSld>
+  <p:clrMapOvr>
+    <a:masterClrMapping/>
+  </p:clrMapOvr>
+  <p:transition xmlns:p14="http://schemas.microsoft.com/office/powerpoint/2010/main"/>
+  <p:timing>
+    <p:tnLst>
+      <p:par>
+        <p:cTn xmlns:p14="http://schemas.microsoft.com/office/powerpoint/2010/main" id="1" dur="indefinite" restart="never" nodeType="tmRoot"/>
+      </p:par>
+    </p:tnLst>
+  </p:timing>
+</p:sld>
+</file>
+
+<file path=ppt/slides/slide14.xml><?xml version="1.0" encoding="utf-8"?>
+<p:sld xmlns:a="http://schemas.openxmlformats.org/drawingml/2006/main" xmlns:r="http://schemas.openxmlformats.org/officeDocument/2006/relationships" xmlns:p="http://schemas.openxmlformats.org/presentationml/2006/main">
+  <p:cSld>
+    <p:spTree>
+      <p:nvGrpSpPr>
+        <p:cNvPr id="1" name=""/>
+        <p:cNvGrpSpPr/>
+        <p:nvPr/>
+      </p:nvGrpSpPr>
+      <p:grpSpPr>
+        <a:xfrm>
+          <a:off x="0" y="0"/>
+          <a:ext cx="0" cy="0"/>
+          <a:chOff x="0" y="0"/>
+          <a:chExt cx="0" cy="0"/>
+        </a:xfrm>
+      </p:grpSpPr>
+      <p:sp>
+        <p:nvSpPr>
+          <p:cNvPr id="16386" name="Rectangle 1"/>
+          <p:cNvSpPr>
+            <a:spLocks noGrp="1" noChangeArrowheads="1"/>
+          </p:cNvSpPr>
+          <p:nvPr>
+            <p:ph type="title"/>
+          </p:nvPr>
+        </p:nvSpPr>
+        <p:spPr>
+          <a:xfrm>
+            <a:off x="490435" y="255927"/>
+            <a:ext cx="10179255" cy="423263"/>
+          </a:xfrm>
+        </p:spPr>
+        <p:txBody>
+          <a:bodyPr rIns="41783" anchor="b"/>
+          <a:lstStyle/>
+          <a:p>
+            <a:pPr eaLnBrk="1" hangingPunct="1"/>
             <a:r>
               <a:rPr lang="en-US" dirty="0" smtClean="0"/>
-              <a:t> Platform in Developer </a:t>
+              <a:t>Start eXo Platform in Developer </a:t>
             </a:r>
             <a:r>
               <a:rPr lang="en-US" dirty="0"/>
@@ -19940,7 +20127,7 @@
 </p:sld>
 </file>
 
-<file path=ppt/slides/slide14.xml><?xml version="1.0" encoding="utf-8"?>
+<file path=ppt/slides/slide15.xml><?xml version="1.0" encoding="utf-8"?>
 <p:sld xmlns:a="http://schemas.openxmlformats.org/drawingml/2006/main" xmlns:r="http://schemas.openxmlformats.org/officeDocument/2006/relationships" xmlns:p="http://schemas.openxmlformats.org/presentationml/2006/main">
   <p:cSld>
     <p:spTree>
@@ -20054,7 +20241,7 @@
                   <a:tab pos="9144000" algn="l"/>
                 </a:tabLst>
               </a:pPr>
-              <a:t>14</a:t>
+              <a:t>15</a:t>
             </a:fld>
             <a:endParaRPr lang="en-GB" sz="1400">
               <a:solidFill>
@@ -20194,150 +20381,6 @@
 </p:sld>
 </file>
 
-<file path=ppt/slides/slide15.xml><?xml version="1.0" encoding="utf-8"?>
-<p:sld xmlns:a="http://schemas.openxmlformats.org/drawingml/2006/main" xmlns:r="http://schemas.openxmlformats.org/officeDocument/2006/relationships" xmlns:p="http://schemas.openxmlformats.org/presentationml/2006/main">
-  <p:cSld>
-    <p:spTree>
-      <p:nvGrpSpPr>
-        <p:cNvPr id="1" name=""/>
-        <p:cNvGrpSpPr/>
-        <p:nvPr/>
-      </p:nvGrpSpPr>
-      <p:grpSpPr>
-        <a:xfrm>
-          <a:off x="0" y="0"/>
-          <a:ext cx="0" cy="0"/>
-          <a:chOff x="0" y="0"/>
-          <a:chExt cx="0" cy="0"/>
-        </a:xfrm>
-      </p:grpSpPr>
-      <p:sp>
-        <p:nvSpPr>
-          <p:cNvPr id="15362" name="Rectangle 1"/>
-          <p:cNvSpPr>
-            <a:spLocks noGrp="1" noChangeArrowheads="1"/>
-          </p:cNvSpPr>
-          <p:nvPr>
-            <p:ph type="title"/>
-          </p:nvPr>
-        </p:nvSpPr>
-        <p:spPr>
-          <a:xfrm>
-            <a:off x="490435" y="255926"/>
-            <a:ext cx="10179255" cy="454024"/>
-          </a:xfrm>
-        </p:spPr>
-        <p:txBody>
-          <a:bodyPr rIns="41783" anchor="b"/>
-          <a:lstStyle/>
-          <a:p>
-            <a:pPr eaLnBrk="1" hangingPunct="1"/>
-            <a:r>
-              <a:rPr lang="en-US" dirty="0" smtClean="0"/>
-              <a:t>Installing </a:t>
-            </a:r>
-            <a:r>
-              <a:rPr lang="en-US" dirty="0" err="1" smtClean="0"/>
-              <a:t>eXo</a:t>
-            </a:r>
-            <a:r>
-              <a:rPr lang="en-US" dirty="0" smtClean="0"/>
-              <a:t> on </a:t>
-            </a:r>
-            <a:r>
-              <a:rPr lang="en-US" dirty="0" err="1" smtClean="0"/>
-              <a:t>JBoss</a:t>
-            </a:r>
-            <a:r>
-              <a:rPr lang="en-US" dirty="0" smtClean="0"/>
-              <a:t> EAP - Introduction</a:t>
-            </a:r>
-          </a:p>
-        </p:txBody>
-      </p:sp>
-      <p:sp>
-        <p:nvSpPr>
-          <p:cNvPr id="15363" name="Rectangle 2"/>
-          <p:cNvSpPr>
-            <a:spLocks noGrp="1" noChangeArrowheads="1"/>
-          </p:cNvSpPr>
-          <p:nvPr>
-            <p:ph type="body" idx="1"/>
-          </p:nvPr>
-        </p:nvSpPr>
-        <p:spPr>
-          <a:xfrm>
-            <a:off x="507964" y="1350945"/>
-            <a:ext cx="10179255" cy="5089000"/>
-          </a:xfrm>
-        </p:spPr>
-        <p:txBody>
-          <a:bodyPr rIns="41783"/>
-          <a:lstStyle/>
-          <a:p>
-            <a:pPr marL="219361" indent="-216749">
-              <a:buNone/>
-            </a:pPr>
-            <a:r>
-              <a:rPr lang="en-US" dirty="0" smtClean="0"/>
-              <a:t>Introduction</a:t>
-            </a:r>
-            <a:endParaRPr lang="en-US" dirty="0"/>
-          </a:p>
-          <a:p>
-            <a:pPr marL="584962" lvl="1" indent="-219361"/>
-            <a:r>
-              <a:rPr lang="en-US" dirty="0" smtClean="0"/>
-              <a:t>No package. No prepared script.</a:t>
-            </a:r>
-          </a:p>
-          <a:p>
-            <a:pPr marL="584962" lvl="1" indent="-219361"/>
-            <a:r>
-              <a:rPr lang="en-US" dirty="0" smtClean="0"/>
-              <a:t>Installation on the top of a default </a:t>
-            </a:r>
-            <a:r>
-              <a:rPr lang="en-US" dirty="0" err="1" smtClean="0"/>
-              <a:t>JBoss</a:t>
-            </a:r>
-            <a:r>
-              <a:rPr lang="en-US" dirty="0" smtClean="0"/>
-              <a:t> installation</a:t>
-            </a:r>
-            <a:endParaRPr lang="en-US" dirty="0" smtClean="0"/>
-          </a:p>
-          <a:p>
-            <a:pPr marL="584962" lvl="1" indent="-219361"/>
-            <a:r>
-              <a:rPr lang="en-US" dirty="0" smtClean="0"/>
-              <a:t>Copy several files, adapt configuration and logging. </a:t>
-            </a:r>
-            <a:endParaRPr lang="en-US" dirty="0"/>
-          </a:p>
-        </p:txBody>
-      </p:sp>
-    </p:spTree>
-    <p:extLst>
-      <p:ext uri="{BB962C8B-B14F-4D97-AF65-F5344CB8AC3E}">
-        <p14:creationId xmlns:p14="http://schemas.microsoft.com/office/powerpoint/2010/main" val="2093689491"/>
-      </p:ext>
-    </p:extLst>
-  </p:cSld>
-  <p:clrMapOvr>
-    <a:masterClrMapping/>
-  </p:clrMapOvr>
-  <p:transition xmlns:p14="http://schemas.microsoft.com/office/powerpoint/2010/main"/>
-  <p:timing>
-    <p:tnLst>
-      <p:par>
-        <p:cTn xmlns:p14="http://schemas.microsoft.com/office/powerpoint/2010/main" id="1" dur="indefinite" restart="never" nodeType="tmRoot"/>
-      </p:par>
-    </p:tnLst>
-  </p:timing>
-</p:sld>
-</file>
-
 <file path=ppt/slides/slide16.xml><?xml version="1.0" encoding="utf-8"?>
 <p:sld xmlns:a="http://schemas.openxmlformats.org/drawingml/2006/main" xmlns:r="http://schemas.openxmlformats.org/officeDocument/2006/relationships" xmlns:p="http://schemas.openxmlformats.org/presentationml/2006/main">
   <p:cSld>
@@ -20378,23 +20421,7 @@
             <a:pPr eaLnBrk="1" hangingPunct="1"/>
             <a:r>
               <a:rPr lang="en-US" dirty="0" smtClean="0"/>
-              <a:t>Installing </a:t>
-            </a:r>
-            <a:r>
-              <a:rPr lang="en-US" dirty="0" err="1" smtClean="0"/>
-              <a:t>eXo</a:t>
-            </a:r>
-            <a:r>
-              <a:rPr lang="en-US" dirty="0" smtClean="0"/>
-              <a:t> on </a:t>
-            </a:r>
-            <a:r>
-              <a:rPr lang="en-US" dirty="0" err="1" smtClean="0"/>
-              <a:t>JBoss</a:t>
-            </a:r>
-            <a:r>
-              <a:rPr lang="en-US" dirty="0" smtClean="0"/>
-              <a:t> EAP – EARs</a:t>
+              <a:t>Installing eXo on JBoss EAP - Introduction</a:t>
             </a:r>
           </a:p>
         </p:txBody>
@@ -20424,174 +20451,29 @@
             </a:pPr>
             <a:r>
               <a:rPr lang="en-US" dirty="0" smtClean="0"/>
-              <a:t>Copy to </a:t>
-            </a:r>
-            <a:r>
-              <a:rPr lang="en-US" dirty="0"/>
-              <a:t>files </a:t>
-            </a:r>
+              <a:t>Introduction</a:t>
+            </a:r>
+            <a:endParaRPr lang="en-US" dirty="0"/>
+          </a:p>
+          <a:p>
+            <a:pPr marL="584962" lvl="1" indent="-219361"/>
             <a:r>
               <a:rPr lang="en-US" dirty="0" smtClean="0"/>
-              <a:t>to </a:t>
-            </a:r>
-            <a:r>
-              <a:rPr lang="en-US" dirty="0" err="1" smtClean="0"/>
-              <a:t>jboss</a:t>
-            </a:r>
-            <a:r>
-              <a:rPr lang="en-US" dirty="0"/>
-              <a:t>-root/server/default/</a:t>
-            </a:r>
+              <a:t>No package. No prepared script.</a:t>
+            </a:r>
+          </a:p>
+          <a:p>
+            <a:pPr marL="584962" lvl="1" indent="-219361"/>
             <a:r>
               <a:rPr lang="en-US" dirty="0" smtClean="0"/>
-              <a:t>deploy</a:t>
-            </a:r>
-            <a:endParaRPr lang="en-US" dirty="0"/>
+              <a:t>Installation on the top of a default JBoss installation</a:t>
+            </a:r>
           </a:p>
           <a:p>
             <a:pPr marL="584962" lvl="1" indent="-219361"/>
             <a:r>
-              <a:rPr lang="en-US" dirty="0" err="1"/>
-              <a:t>gatein-ds.xml</a:t>
-            </a:r>
-            <a:endParaRPr lang="en-US" dirty="0"/>
-          </a:p>
-          <a:p>
-            <a:pPr marL="584962" lvl="1" indent="-219361"/>
-            <a:r>
-              <a:rPr lang="en-US" dirty="0" err="1"/>
-              <a:t>gatein.ear</a:t>
-            </a:r>
-            <a:r>
-              <a:rPr lang="en-US" dirty="0"/>
-              <a:t> (it must remain a folder named </a:t>
-            </a:r>
-            <a:r>
-              <a:rPr lang="en-US" dirty="0" err="1"/>
-              <a:t>gatein.ear</a:t>
-            </a:r>
-            <a:r>
-              <a:rPr lang="en-US" dirty="0"/>
-              <a:t>)</a:t>
-            </a:r>
-          </a:p>
-          <a:p>
-            <a:pPr marL="584962" lvl="1" indent="-219361"/>
-            <a:r>
-              <a:rPr lang="en-US" dirty="0"/>
-              <a:t>starter-</a:t>
-            </a:r>
-            <a:r>
-              <a:rPr lang="en-US" dirty="0" err="1"/>
-              <a:t>gatein.ear</a:t>
-            </a:r>
-            <a:endParaRPr lang="en-US" dirty="0"/>
-          </a:p>
-          <a:p>
-            <a:pPr marL="584962" lvl="1" indent="-219361"/>
-            <a:r>
-              <a:rPr lang="en-US" dirty="0"/>
-              <a:t>acme-</a:t>
-            </a:r>
-            <a:r>
-              <a:rPr lang="en-US" dirty="0" err="1"/>
-              <a:t>website.ear</a:t>
-            </a:r>
-            <a:endParaRPr lang="en-US" dirty="0"/>
-          </a:p>
-          <a:p>
-            <a:pPr marL="584962" lvl="1" indent="-219361"/>
-            <a:r>
-              <a:rPr lang="en-US" dirty="0"/>
-              <a:t>office-</a:t>
-            </a:r>
-            <a:r>
-              <a:rPr lang="en-US" dirty="0" err="1"/>
-              <a:t>portal.ear</a:t>
-            </a:r>
-            <a:endParaRPr lang="en-US" dirty="0"/>
-          </a:p>
-          <a:p>
-            <a:pPr marL="584962" lvl="1" indent="-219361"/>
-            <a:r>
-              <a:rPr lang="en-US" dirty="0"/>
-              <a:t>platform-</a:t>
-            </a:r>
-            <a:r>
-              <a:rPr lang="en-US" dirty="0" err="1"/>
-              <a:t>extension.ear</a:t>
-            </a:r>
-            <a:endParaRPr lang="en-US" dirty="0"/>
-          </a:p>
-          <a:p>
-            <a:pPr marL="584962" lvl="1" indent="-219361"/>
-            <a:r>
-              <a:rPr lang="en-US" dirty="0" err="1"/>
-              <a:t>exo-collaboration.ear</a:t>
-            </a:r>
-            <a:endParaRPr lang="en-US" dirty="0"/>
-          </a:p>
-          <a:p>
-            <a:pPr marL="584962" lvl="1" indent="-219361"/>
-            <a:r>
-              <a:rPr lang="en-US" dirty="0" err="1"/>
-              <a:t>exo</a:t>
-            </a:r>
-            <a:r>
-              <a:rPr lang="en-US" dirty="0"/>
-              <a:t>-social-</a:t>
-            </a:r>
-            <a:r>
-              <a:rPr lang="en-US" dirty="0" err="1"/>
-              <a:t>extension.ear</a:t>
-            </a:r>
-            <a:endParaRPr lang="en-US" dirty="0"/>
-          </a:p>
-          <a:p>
-            <a:pPr marL="584962" lvl="1" indent="-219361"/>
-            <a:r>
-              <a:rPr lang="en-US" dirty="0" err="1"/>
-              <a:t>gatein-exo-ks.ear</a:t>
-            </a:r>
-            <a:endParaRPr lang="en-US" dirty="0"/>
-          </a:p>
-          <a:p>
-            <a:pPr marL="584962" lvl="1" indent="-219361"/>
-            <a:r>
-              <a:rPr lang="en-US" dirty="0" err="1"/>
-              <a:t>gatein</a:t>
-            </a:r>
-            <a:r>
-              <a:rPr lang="en-US" dirty="0"/>
-              <a:t>-</a:t>
-            </a:r>
-            <a:r>
-              <a:rPr lang="en-US" dirty="0" err="1"/>
-              <a:t>wcm</a:t>
-            </a:r>
-            <a:r>
-              <a:rPr lang="en-US" dirty="0"/>
-              <a:t>-extension-</a:t>
-            </a:r>
-            <a:r>
-              <a:rPr lang="en-US" dirty="0" err="1"/>
-              <a:t>plf.ear</a:t>
-            </a:r>
-            <a:endParaRPr lang="en-US" dirty="0"/>
-          </a:p>
-          <a:p>
-            <a:pPr marL="584962" lvl="1" indent="-219361"/>
-            <a:r>
-              <a:rPr lang="en-US" dirty="0" err="1"/>
-              <a:t>gatein</a:t>
-            </a:r>
-            <a:r>
-              <a:rPr lang="en-US" dirty="0"/>
-              <a:t>-workflow-extension-</a:t>
-            </a:r>
-            <a:r>
-              <a:rPr lang="en-US" dirty="0" err="1" smtClean="0"/>
-              <a:t>plf.ear</a:t>
+              <a:rPr lang="en-US" dirty="0" smtClean="0"/>
+              <a:t>Copy several files, adapt configuration and logging. </a:t>
             </a:r>
             <a:endParaRPr lang="en-US" dirty="0"/>
           </a:p>
@@ -20600,7 +20482,7 @@
     </p:spTree>
     <p:extLst>
       <p:ext uri="{BB962C8B-B14F-4D97-AF65-F5344CB8AC3E}">
-        <p14:creationId xmlns:p14="http://schemas.microsoft.com/office/powerpoint/2010/main" val="3057485766"/>
+        <p14:creationId xmlns:p14="http://schemas.microsoft.com/office/powerpoint/2010/main" val="2093689491"/>
       </p:ext>
     </p:extLst>
   </p:cSld>
@@ -20658,23 +20540,7 @@
             <a:pPr eaLnBrk="1" hangingPunct="1"/>
             <a:r>
               <a:rPr lang="en-US" dirty="0" smtClean="0"/>
-              <a:t>Installing </a:t>
-            </a:r>
-            <a:r>
-              <a:rPr lang="en-US" dirty="0" err="1" smtClean="0"/>
-              <a:t>eXo</a:t>
-            </a:r>
-            <a:r>
-              <a:rPr lang="en-US" dirty="0" smtClean="0"/>
-              <a:t> on </a:t>
-            </a:r>
-            <a:r>
-              <a:rPr lang="en-US" dirty="0" err="1" smtClean="0"/>
-              <a:t>JBoss</a:t>
-            </a:r>
-            <a:r>
-              <a:rPr lang="en-US" dirty="0" smtClean="0"/>
-              <a:t> EAP – Configuration files </a:t>
+              <a:t>Installing eXo on JBoss EAP – EARs</a:t>
             </a:r>
           </a:p>
         </p:txBody>
@@ -20704,26 +20570,18 @@
             </a:pPr>
             <a:r>
               <a:rPr lang="en-US" dirty="0" smtClean="0"/>
-              <a:t>Create a </a:t>
+              <a:t>Copy to </a:t>
+            </a:r>
+            <a:r>
+              <a:rPr lang="en-US" dirty="0"/>
+              <a:t>files </a:t>
+            </a:r>
+            <a:r>
+              <a:rPr lang="en-US" dirty="0" smtClean="0"/>
+              <a:t>to </a:t>
             </a:r>
             <a:r>
               <a:rPr lang="en-US" dirty="0" err="1" smtClean="0"/>
-              <a:t>config</a:t>
-            </a:r>
-            <a:r>
-              <a:rPr lang="en-US" dirty="0" smtClean="0"/>
-              <a:t> folder:</a:t>
-            </a:r>
-            <a:endParaRPr lang="en-US" dirty="0"/>
-          </a:p>
-          <a:p>
-            <a:pPr marL="584962" lvl="1" indent="-219361"/>
-            <a:r>
-              <a:rPr lang="en-US" dirty="0"/>
-              <a:t>Create a folder </a:t>
-            </a:r>
-            <a:r>
-              <a:rPr lang="en-US" dirty="0" err="1"/>
               <a:t>jboss</a:t>
             </a:r>
             <a:r>
@@ -20731,124 +20589,156 @@
               <a:t>-root/server/default/</a:t>
             </a:r>
             <a:r>
+              <a:rPr lang="en-US" dirty="0" smtClean="0"/>
+              <a:t>deploy</a:t>
+            </a:r>
+            <a:endParaRPr lang="en-US" dirty="0"/>
+          </a:p>
+          <a:p>
+            <a:pPr marL="584962" lvl="1" indent="-219361"/>
+            <a:r>
               <a:rPr lang="en-US" dirty="0" err="1"/>
-              <a:t>conf</a:t>
+              <a:t>gatein-ds.xml</a:t>
+            </a:r>
+            <a:endParaRPr lang="en-US" dirty="0"/>
+          </a:p>
+          <a:p>
+            <a:pPr marL="584962" lvl="1" indent="-219361"/>
+            <a:r>
+              <a:rPr lang="en-US" dirty="0" err="1"/>
+              <a:t>gatein.ear</a:t>
             </a:r>
             <a:r>
               <a:rPr lang="en-US" dirty="0"/>
-              <a:t>/</a:t>
-            </a:r>
+              <a:t> (it must remain a folder named </a:t>
+            </a:r>
+            <a:r>
+              <a:rPr lang="en-US" dirty="0" err="1"/>
+              <a:t>gatein.ear</a:t>
+            </a:r>
+            <a:r>
+              <a:rPr lang="en-US" dirty="0"/>
+              <a:t>)</a:t>
+            </a:r>
+          </a:p>
+          <a:p>
+            <a:pPr marL="584962" lvl="1" indent="-219361"/>
+            <a:r>
+              <a:rPr lang="en-US" dirty="0"/>
+              <a:t>starter-</a:t>
+            </a:r>
+            <a:r>
+              <a:rPr lang="en-US" dirty="0" err="1"/>
+              <a:t>gatein.ear</a:t>
+            </a:r>
+            <a:endParaRPr lang="en-US" dirty="0"/>
+          </a:p>
+          <a:p>
+            <a:pPr marL="584962" lvl="1" indent="-219361"/>
+            <a:r>
+              <a:rPr lang="en-US" dirty="0"/>
+              <a:t>acme-</a:t>
+            </a:r>
+            <a:r>
+              <a:rPr lang="en-US" dirty="0" err="1"/>
+              <a:t>website.ear</a:t>
+            </a:r>
+            <a:endParaRPr lang="en-US" dirty="0"/>
+          </a:p>
+          <a:p>
+            <a:pPr marL="584962" lvl="1" indent="-219361"/>
+            <a:r>
+              <a:rPr lang="en-US" dirty="0"/>
+              <a:t>office-</a:t>
+            </a:r>
+            <a:r>
+              <a:rPr lang="en-US" dirty="0" err="1"/>
+              <a:t>portal.ear</a:t>
+            </a:r>
+            <a:endParaRPr lang="en-US" dirty="0"/>
+          </a:p>
+          <a:p>
+            <a:pPr marL="584962" lvl="1" indent="-219361"/>
+            <a:r>
+              <a:rPr lang="en-US" dirty="0"/>
+              <a:t>platform-</a:t>
+            </a:r>
+            <a:r>
+              <a:rPr lang="en-US" dirty="0" err="1"/>
+              <a:t>extension.ear</a:t>
+            </a:r>
+            <a:endParaRPr lang="en-US" dirty="0"/>
+          </a:p>
+          <a:p>
+            <a:pPr marL="584962" lvl="1" indent="-219361"/>
+            <a:r>
+              <a:rPr lang="en-US" dirty="0" err="1"/>
+              <a:t>exo-collaboration.ear</a:t>
+            </a:r>
+            <a:endParaRPr lang="en-US" dirty="0"/>
+          </a:p>
+          <a:p>
+            <a:pPr marL="584962" lvl="1" indent="-219361"/>
+            <a:r>
+              <a:rPr lang="en-US" dirty="0" err="1"/>
+              <a:t>exo</a:t>
+            </a:r>
+            <a:r>
+              <a:rPr lang="en-US" dirty="0"/>
+              <a:t>-social-</a:t>
+            </a:r>
+            <a:r>
+              <a:rPr lang="en-US" dirty="0" err="1"/>
+              <a:t>extension.ear</a:t>
+            </a:r>
+            <a:endParaRPr lang="en-US" dirty="0"/>
+          </a:p>
+          <a:p>
+            <a:pPr marL="584962" lvl="1" indent="-219361"/>
+            <a:r>
+              <a:rPr lang="en-US" dirty="0" err="1"/>
+              <a:t>gatein-exo-ks.ear</a:t>
+            </a:r>
+            <a:endParaRPr lang="en-US" dirty="0"/>
+          </a:p>
+          <a:p>
+            <a:pPr marL="584962" lvl="1" indent="-219361"/>
             <a:r>
               <a:rPr lang="en-US" dirty="0" err="1"/>
               <a:t>gatein</a:t>
             </a:r>
             <a:r>
               <a:rPr lang="en-US" dirty="0"/>
-              <a:t> </a:t>
-            </a:r>
-          </a:p>
-          <a:p>
-            <a:pPr marL="219361" indent="-216749">
-              <a:buNone/>
-            </a:pPr>
-            <a:r>
-              <a:rPr lang="en-US" dirty="0" smtClean="0"/>
-              <a:t>Copy </a:t>
+              <a:t>-</a:t>
             </a:r>
             <a:r>
               <a:rPr lang="en-US" dirty="0" err="1"/>
-              <a:t>config</a:t>
+              <a:t>wcm</a:t>
             </a:r>
             <a:r>
               <a:rPr lang="en-US" dirty="0"/>
-              <a:t> </a:t>
-            </a:r>
-            <a:r>
-              <a:rPr lang="en-US" dirty="0" smtClean="0"/>
-              <a:t>files:</a:t>
+              <a:t>-extension-</a:t>
+            </a:r>
+            <a:r>
+              <a:rPr lang="en-US" dirty="0" err="1"/>
+              <a:t>plf.ear</a:t>
             </a:r>
             <a:endParaRPr lang="en-US" dirty="0"/>
           </a:p>
           <a:p>
             <a:pPr marL="584962" lvl="1" indent="-219361"/>
             <a:r>
+              <a:rPr lang="en-US" dirty="0" err="1"/>
+              <a:t>gatein</a:t>
+            </a:r>
+            <a:r>
+              <a:rPr lang="en-US" dirty="0"/>
+              <a:t>-workflow-extension-</a:t>
+            </a:r>
+            <a:r>
               <a:rPr lang="en-US" dirty="0" err="1" smtClean="0"/>
-              <a:t>configuration.properties</a:t>
-            </a:r>
-            <a:endParaRPr lang="en-US" dirty="0"/>
-          </a:p>
-          <a:p>
-            <a:pPr marL="584962" lvl="1" indent="-219361"/>
-            <a:r>
-              <a:rPr lang="en-US" dirty="0" err="1"/>
-              <a:t>configuration.xml</a:t>
-            </a:r>
-            <a:endParaRPr lang="en-US" dirty="0"/>
-          </a:p>
-          <a:p>
-            <a:pPr marL="219361" indent="-216749">
-              <a:buNone/>
-            </a:pPr>
-            <a:r>
-              <a:rPr lang="en-US" dirty="0"/>
-              <a:t>Copy </a:t>
-            </a:r>
-            <a:r>
-              <a:rPr lang="en-US" dirty="0" smtClean="0"/>
-              <a:t>the key files </a:t>
-            </a:r>
-            <a:r>
-              <a:rPr lang="en-US" dirty="0"/>
-              <a:t>in </a:t>
-            </a:r>
-            <a:r>
-              <a:rPr lang="en-US" dirty="0" err="1"/>
-              <a:t>jboss</a:t>
-            </a:r>
-            <a:r>
-              <a:rPr lang="en-US" dirty="0"/>
-              <a:t>-root/</a:t>
-            </a:r>
-            <a:r>
-              <a:rPr lang="en-US" dirty="0" smtClean="0"/>
-              <a:t>bin:</a:t>
-            </a:r>
-            <a:endParaRPr lang="en-US" dirty="0"/>
-          </a:p>
-          <a:p>
-            <a:pPr marL="584962" lvl="1" indent="-219361"/>
-            <a:r>
-              <a:rPr lang="en-US" dirty="0" err="1" smtClean="0"/>
-              <a:t>exokey.pem</a:t>
-            </a:r>
-            <a:endParaRPr lang="en-US" dirty="0"/>
-          </a:p>
-          <a:p>
-            <a:pPr marL="584962" lvl="1" indent="-219361"/>
-            <a:r>
-              <a:rPr lang="en-US" dirty="0" err="1" smtClean="0"/>
-              <a:t>oauthkey.pem</a:t>
-            </a:r>
-            <a:endParaRPr lang="en-US" dirty="0" smtClean="0"/>
-          </a:p>
-          <a:p>
-            <a:pPr marL="584962" lvl="1" indent="-219361"/>
-            <a:endParaRPr lang="en-US" dirty="0"/>
-          </a:p>
-          <a:p>
-            <a:pPr marL="219361" indent="-216749">
-              <a:buNone/>
-            </a:pPr>
-            <a:r>
-              <a:rPr lang="en-US" dirty="0" smtClean="0"/>
-              <a:t>The copied files are explained in a later chapter.</a:t>
-            </a:r>
-            <a:endParaRPr lang="en-US" dirty="0"/>
-          </a:p>
-          <a:p>
-            <a:pPr marL="365601" lvl="1" indent="0">
-              <a:buNone/>
-            </a:pPr>
+              <a:t>plf.ear</a:t>
+            </a:r>
             <a:endParaRPr lang="en-US" dirty="0"/>
           </a:p>
         </p:txBody>
@@ -20856,7 +20746,7 @@
     </p:spTree>
     <p:extLst>
       <p:ext uri="{BB962C8B-B14F-4D97-AF65-F5344CB8AC3E}">
-        <p14:creationId xmlns:p14="http://schemas.microsoft.com/office/powerpoint/2010/main" val="3481134414"/>
+        <p14:creationId xmlns:p14="http://schemas.microsoft.com/office/powerpoint/2010/main" val="3057485766"/>
       </p:ext>
     </p:extLst>
   </p:cSld>
@@ -20913,30 +20803,9 @@
           <a:p>
             <a:pPr eaLnBrk="1" hangingPunct="1"/>
             <a:r>
-              <a:rPr lang="en-US" dirty="0"/>
-              <a:t>Installing </a:t>
-            </a:r>
-            <a:r>
-              <a:rPr lang="en-US" dirty="0" err="1"/>
-              <a:t>eXo</a:t>
-            </a:r>
-            <a:r>
-              <a:rPr lang="en-US" dirty="0"/>
-              <a:t> on </a:t>
-            </a:r>
-            <a:r>
-              <a:rPr lang="en-US" dirty="0" err="1"/>
-              <a:t>JBoss</a:t>
-            </a:r>
-            <a:r>
-              <a:rPr lang="en-US" dirty="0"/>
-              <a:t> EAP – JVM </a:t>
-            </a:r>
-            <a:r>
-              <a:rPr lang="en-US" dirty="0" err="1"/>
-              <a:t>Params</a:t>
-            </a:r>
-            <a:endParaRPr lang="en-US" dirty="0" smtClean="0"/>
+              <a:rPr lang="en-US" dirty="0" smtClean="0"/>
+              <a:t>Installing eXo on JBoss EAP – Configuration files </a:t>
+            </a:r>
           </a:p>
         </p:txBody>
       </p:sp>
@@ -20953,7 +20822,7 @@
         <p:spPr>
           <a:xfrm>
             <a:off x="507964" y="1350945"/>
-            <a:ext cx="10400690" cy="5089000"/>
+            <a:ext cx="10179255" cy="5089000"/>
           </a:xfrm>
         </p:spPr>
         <p:txBody>
@@ -20961,520 +20830,163 @@
           <a:lstStyle/>
           <a:p>
             <a:pPr marL="219361" indent="-216749">
-              <a:lnSpc>
-                <a:spcPct val="90000"/>
-              </a:lnSpc>
               <a:buNone/>
             </a:pPr>
             <a:r>
-              <a:rPr lang="fr-FR" dirty="0" err="1" smtClean="0"/>
-              <a:t>Add</a:t>
-            </a:r>
-            <a:r>
-              <a:rPr lang="fr-FR" dirty="0" smtClean="0"/>
+              <a:rPr lang="en-US" dirty="0" smtClean="0"/>
+              <a:t>Create a </a:t>
+            </a:r>
+            <a:r>
+              <a:rPr lang="en-US" dirty="0" err="1" smtClean="0"/>
+              <a:t>config</a:t>
+            </a:r>
+            <a:r>
+              <a:rPr lang="en-US" dirty="0" smtClean="0"/>
+              <a:t> folder:</a:t>
+            </a:r>
+            <a:endParaRPr lang="en-US" dirty="0"/>
+          </a:p>
+          <a:p>
+            <a:pPr marL="584962" lvl="1" indent="-219361"/>
+            <a:r>
+              <a:rPr lang="en-US" dirty="0"/>
+              <a:t>Create a folder </a:t>
+            </a:r>
+            <a:r>
+              <a:rPr lang="en-US" dirty="0" err="1"/>
+              <a:t>jboss</a:t>
+            </a:r>
+            <a:r>
+              <a:rPr lang="en-US" dirty="0"/>
+              <a:t>-root/server/default/</a:t>
+            </a:r>
+            <a:r>
+              <a:rPr lang="en-US" dirty="0" err="1"/>
+              <a:t>conf</a:t>
+            </a:r>
+            <a:r>
+              <a:rPr lang="en-US" dirty="0"/>
+              <a:t>/</a:t>
+            </a:r>
+            <a:r>
+              <a:rPr lang="en-US" dirty="0" err="1"/>
+              <a:t>gatein</a:t>
+            </a:r>
+            <a:r>
+              <a:rPr lang="en-US" dirty="0"/>
               <a:t> </a:t>
             </a:r>
-            <a:r>
-              <a:rPr lang="fr-FR" dirty="0" err="1" smtClean="0"/>
-              <a:t>these</a:t>
-            </a:r>
-            <a:r>
-              <a:rPr lang="fr-FR" dirty="0" smtClean="0"/>
+          </a:p>
+          <a:p>
+            <a:pPr marL="219361" indent="-216749">
+              <a:buNone/>
+            </a:pPr>
+            <a:r>
+              <a:rPr lang="en-US" dirty="0" smtClean="0"/>
+              <a:t>Copy </a:t>
+            </a:r>
+            <a:r>
+              <a:rPr lang="en-US" dirty="0" err="1"/>
+              <a:t>config</a:t>
+            </a:r>
+            <a:r>
+              <a:rPr lang="en-US" dirty="0"/>
               <a:t> </a:t>
             </a:r>
             <a:r>
-              <a:rPr lang="fr-FR" dirty="0" err="1" smtClean="0"/>
-              <a:t>lines</a:t>
-            </a:r>
-            <a:r>
-              <a:rPr lang="fr-FR" dirty="0" smtClean="0"/>
-              <a:t> </a:t>
-            </a:r>
-            <a:r>
-              <a:rPr lang="fr-FR" dirty="0" err="1" smtClean="0"/>
-              <a:t>at</a:t>
-            </a:r>
-            <a:r>
-              <a:rPr lang="fr-FR" dirty="0" smtClean="0"/>
-              <a:t> the end of </a:t>
-            </a:r>
-            <a:r>
-              <a:rPr lang="fr-FR" dirty="0" err="1" smtClean="0"/>
-              <a:t>jboss-root</a:t>
-            </a:r>
-            <a:r>
-              <a:rPr lang="fr-FR" dirty="0" smtClean="0"/>
-              <a:t>/bin/</a:t>
-            </a:r>
-            <a:r>
-              <a:rPr lang="fr-FR" dirty="0" err="1" smtClean="0"/>
-              <a:t>run.conf</a:t>
-            </a:r>
-            <a:r>
-              <a:rPr lang="fr-FR" dirty="0" smtClean="0"/>
-              <a:t> (Linux)</a:t>
-            </a:r>
-            <a:r>
               <a:rPr lang="en-US" dirty="0" smtClean="0"/>
-              <a:t>:</a:t>
-            </a:r>
-          </a:p>
-          <a:p>
-            <a:pPr marL="362426" indent="0">
-              <a:lnSpc>
-                <a:spcPct val="90000"/>
-              </a:lnSpc>
+              <a:t>files:</a:t>
+            </a:r>
+            <a:endParaRPr lang="en-US" dirty="0"/>
+          </a:p>
+          <a:p>
+            <a:pPr marL="584962" lvl="1" indent="-219361"/>
+            <a:r>
+              <a:rPr lang="en-US" dirty="0" err="1" smtClean="0"/>
+              <a:t>configuration.properties</a:t>
+            </a:r>
+            <a:endParaRPr lang="en-US" dirty="0"/>
+          </a:p>
+          <a:p>
+            <a:pPr marL="584962" lvl="1" indent="-219361"/>
+            <a:r>
+              <a:rPr lang="en-US" dirty="0" err="1"/>
+              <a:t>configuration.xml</a:t>
+            </a:r>
+            <a:endParaRPr lang="en-US" dirty="0"/>
+          </a:p>
+          <a:p>
+            <a:pPr marL="219361" indent="-216749">
               <a:buNone/>
             </a:pPr>
             <a:r>
-              <a:rPr lang="en-US" sz="2000" b="0" i="0" dirty="0" smtClean="0">
-                <a:ln>
-                  <a:solidFill>
-                    <a:srgbClr val="000000"/>
-                  </a:solidFill>
-                </a:ln>
-              </a:rPr>
-              <a:t>EXO_PROFILES="-</a:t>
-            </a:r>
-            <a:r>
-              <a:rPr lang="en-US" sz="2000" b="0" i="0" dirty="0" err="1" smtClean="0">
-                <a:ln>
-                  <a:solidFill>
-                    <a:srgbClr val="000000"/>
-                  </a:solidFill>
-                </a:ln>
-              </a:rPr>
-              <a:t>Dexo.profiles</a:t>
-            </a:r>
-            <a:r>
-              <a:rPr lang="en-US" sz="2000" b="0" i="0" dirty="0" smtClean="0">
-                <a:ln>
-                  <a:solidFill>
-                    <a:srgbClr val="000000"/>
-                  </a:solidFill>
-                </a:ln>
-              </a:rPr>
-              <a:t>=default" </a:t>
-            </a:r>
-          </a:p>
-          <a:p>
-            <a:pPr marL="362426" indent="0">
-              <a:lnSpc>
-                <a:spcPct val="90000"/>
-              </a:lnSpc>
+              <a:rPr lang="en-US" dirty="0"/>
+              <a:t>Copy </a:t>
+            </a:r>
+            <a:r>
+              <a:rPr lang="en-US" dirty="0" smtClean="0"/>
+              <a:t>the key files </a:t>
+            </a:r>
+            <a:r>
+              <a:rPr lang="en-US" dirty="0"/>
+              <a:t>in </a:t>
+            </a:r>
+            <a:r>
+              <a:rPr lang="en-US" dirty="0" err="1"/>
+              <a:t>jboss</a:t>
+            </a:r>
+            <a:r>
+              <a:rPr lang="en-US" dirty="0"/>
+              <a:t>-root/</a:t>
+            </a:r>
+            <a:r>
+              <a:rPr lang="en-US" dirty="0" smtClean="0"/>
+              <a:t>bin:</a:t>
+            </a:r>
+            <a:endParaRPr lang="en-US" dirty="0"/>
+          </a:p>
+          <a:p>
+            <a:pPr marL="584962" lvl="1" indent="-219361"/>
+            <a:r>
+              <a:rPr lang="en-US" dirty="0" err="1" smtClean="0"/>
+              <a:t>exokey.pem</a:t>
+            </a:r>
+            <a:endParaRPr lang="en-US" dirty="0"/>
+          </a:p>
+          <a:p>
+            <a:pPr marL="584962" lvl="1" indent="-219361"/>
+            <a:r>
+              <a:rPr lang="en-US" dirty="0" err="1" smtClean="0"/>
+              <a:t>oauthkey.pem</a:t>
+            </a:r>
+            <a:endParaRPr lang="en-US" dirty="0" smtClean="0"/>
+          </a:p>
+          <a:p>
+            <a:pPr marL="584962" lvl="1" indent="-219361"/>
+            <a:endParaRPr lang="en-US" dirty="0"/>
+          </a:p>
+          <a:p>
+            <a:pPr marL="219361" indent="-216749">
               <a:buNone/>
             </a:pPr>
             <a:r>
-              <a:rPr lang="en-US" sz="2000" b="0" i="0" dirty="0" smtClean="0">
-                <a:ln>
-                  <a:solidFill>
-                    <a:srgbClr val="000000"/>
-                  </a:solidFill>
-                </a:ln>
-              </a:rPr>
-              <a:t>EXO_OPTS="-</a:t>
-            </a:r>
-            <a:r>
-              <a:rPr lang="en-US" sz="2000" b="0" i="0" dirty="0" err="1" smtClean="0">
-                <a:ln>
-                  <a:solidFill>
-                    <a:srgbClr val="000000"/>
-                  </a:solidFill>
-                </a:ln>
-              </a:rPr>
-              <a:t>Dexo.product.developing</a:t>
-            </a:r>
-            <a:r>
-              <a:rPr lang="en-US" sz="2000" b="0" i="0" dirty="0" smtClean="0">
-                <a:ln>
-                  <a:solidFill>
-                    <a:srgbClr val="000000"/>
-                  </a:solidFill>
-                </a:ln>
-              </a:rPr>
-              <a:t>=false -</a:t>
-            </a:r>
-            <a:r>
-              <a:rPr lang="en-US" sz="2000" b="0" i="0" dirty="0" err="1" smtClean="0">
-                <a:ln>
-                  <a:solidFill>
-                    <a:srgbClr val="000000"/>
-                  </a:solidFill>
-                </a:ln>
-              </a:rPr>
-              <a:t>Dexo.conf.dir.name</a:t>
-            </a:r>
-            <a:r>
-              <a:rPr lang="en-US" sz="2000" b="0" i="0" dirty="0" smtClean="0">
-                <a:ln>
-                  <a:solidFill>
-                    <a:srgbClr val="000000"/>
-                  </a:solidFill>
-                </a:ln>
-              </a:rPr>
-              <a:t>=</a:t>
-            </a:r>
-            <a:r>
-              <a:rPr lang="en-US" sz="2000" b="0" i="0" dirty="0" err="1" smtClean="0">
-                <a:ln>
-                  <a:solidFill>
-                    <a:srgbClr val="000000"/>
-                  </a:solidFill>
-                </a:ln>
-              </a:rPr>
-              <a:t>gatein</a:t>
-            </a:r>
-            <a:r>
-              <a:rPr lang="en-US" sz="2000" b="0" i="0" dirty="0" smtClean="0">
-                <a:ln>
-                  <a:solidFill>
-                    <a:srgbClr val="000000"/>
-                  </a:solidFill>
-                </a:ln>
-              </a:rPr>
-              <a:t> -</a:t>
-            </a:r>
-            <a:r>
-              <a:rPr lang="en-US" sz="2000" b="0" i="0" dirty="0" err="1" smtClean="0">
-                <a:ln>
-                  <a:solidFill>
-                    <a:srgbClr val="000000"/>
-                  </a:solidFill>
-                </a:ln>
-              </a:rPr>
-              <a:t>Dgatein.data.dir</a:t>
-            </a:r>
-            <a:r>
-              <a:rPr lang="en-US" sz="2000" b="0" i="0" dirty="0" smtClean="0">
-                <a:ln>
-                  <a:solidFill>
-                    <a:srgbClr val="000000"/>
-                  </a:solidFill>
-                </a:ln>
-              </a:rPr>
-              <a:t>=../</a:t>
-            </a:r>
-            <a:r>
-              <a:rPr lang="en-US" sz="2000" b="0" i="0" dirty="0" err="1" smtClean="0">
-                <a:ln>
-                  <a:solidFill>
-                    <a:srgbClr val="000000"/>
-                  </a:solidFill>
-                </a:ln>
-              </a:rPr>
-              <a:t>gatein</a:t>
-            </a:r>
-            <a:r>
-              <a:rPr lang="en-US" sz="2000" b="0" i="0" dirty="0" smtClean="0">
-                <a:ln>
-                  <a:solidFill>
-                    <a:srgbClr val="000000"/>
-                  </a:solidFill>
-                </a:ln>
-              </a:rPr>
-              <a:t>" </a:t>
-            </a:r>
-          </a:p>
-          <a:p>
-            <a:pPr marL="362426" indent="0">
-              <a:lnSpc>
-                <a:spcPct val="90000"/>
-              </a:lnSpc>
+              <a:rPr lang="en-US" dirty="0" smtClean="0"/>
+              <a:t>The copied files are explained in a later chapter.</a:t>
+            </a:r>
+            <a:endParaRPr lang="en-US" dirty="0"/>
+          </a:p>
+          <a:p>
+            <a:pPr marL="365601" lvl="1" indent="0">
               <a:buNone/>
             </a:pPr>
-            <a:r>
-              <a:rPr lang="en-US" sz="2000" b="0" i="0" dirty="0" smtClean="0">
-                <a:ln>
-                  <a:solidFill>
-                    <a:srgbClr val="000000"/>
-                  </a:solidFill>
-                </a:ln>
-              </a:rPr>
-              <a:t>REMOTE_DEBUG="-</a:t>
-            </a:r>
-            <a:r>
-              <a:rPr lang="en-US" sz="2000" b="0" i="0" dirty="0" err="1" smtClean="0">
-                <a:ln>
-                  <a:solidFill>
-                    <a:srgbClr val="000000"/>
-                  </a:solidFill>
-                </a:ln>
-              </a:rPr>
-              <a:t>Xdebug</a:t>
-            </a:r>
-            <a:r>
-              <a:rPr lang="en-US" sz="2000" b="0" i="0" dirty="0" smtClean="0">
-                <a:ln>
-                  <a:solidFill>
-                    <a:srgbClr val="000000"/>
-                  </a:solidFill>
-                </a:ln>
-              </a:rPr>
-              <a:t> -</a:t>
-            </a:r>
-            <a:r>
-              <a:rPr lang="en-US" sz="2000" b="0" i="0" dirty="0" err="1" smtClean="0">
-                <a:ln>
-                  <a:solidFill>
-                    <a:srgbClr val="000000"/>
-                  </a:solidFill>
-                </a:ln>
-              </a:rPr>
-              <a:t>Xrunjdwp:transport</a:t>
-            </a:r>
-            <a:r>
-              <a:rPr lang="en-US" sz="2000" b="0" i="0" dirty="0" smtClean="0">
-                <a:ln>
-                  <a:solidFill>
-                    <a:srgbClr val="000000"/>
-                  </a:solidFill>
-                </a:ln>
-              </a:rPr>
-              <a:t>=</a:t>
-            </a:r>
-            <a:r>
-              <a:rPr lang="en-US" sz="2000" b="0" i="0" dirty="0" err="1" smtClean="0">
-                <a:ln>
-                  <a:solidFill>
-                    <a:srgbClr val="000000"/>
-                  </a:solidFill>
-                </a:ln>
-              </a:rPr>
-              <a:t>dt_socket,address</a:t>
-            </a:r>
-            <a:r>
-              <a:rPr lang="en-US" sz="2000" b="0" i="0" dirty="0" smtClean="0">
-                <a:ln>
-                  <a:solidFill>
-                    <a:srgbClr val="000000"/>
-                  </a:solidFill>
-                </a:ln>
-              </a:rPr>
-              <a:t>=8000,server=</a:t>
-            </a:r>
-            <a:r>
-              <a:rPr lang="en-US" sz="2000" b="0" i="0" dirty="0" err="1" smtClean="0">
-                <a:ln>
-                  <a:solidFill>
-                    <a:srgbClr val="000000"/>
-                  </a:solidFill>
-                </a:ln>
-              </a:rPr>
-              <a:t>y,suspend</a:t>
-            </a:r>
-            <a:r>
-              <a:rPr lang="en-US" sz="2000" b="0" i="0" dirty="0" smtClean="0">
-                <a:ln>
-                  <a:solidFill>
-                    <a:srgbClr val="000000"/>
-                  </a:solidFill>
-                </a:ln>
-              </a:rPr>
-              <a:t>=n -</a:t>
-            </a:r>
-            <a:r>
-              <a:rPr lang="en-US" sz="2000" b="0" i="0" dirty="0" err="1" smtClean="0">
-                <a:ln>
-                  <a:solidFill>
-                    <a:srgbClr val="000000"/>
-                  </a:solidFill>
-                </a:ln>
-              </a:rPr>
-              <a:t>Dcom.sun.management.jmxremote</a:t>
-            </a:r>
-            <a:r>
-              <a:rPr lang="en-US" sz="2000" b="0" i="0" dirty="0" smtClean="0">
-                <a:ln>
-                  <a:solidFill>
-                    <a:srgbClr val="000000"/>
-                  </a:solidFill>
-                </a:ln>
-              </a:rPr>
-              <a:t> -</a:t>
-            </a:r>
-            <a:r>
-              <a:rPr lang="en-US" sz="2000" b="0" i="0" dirty="0" err="1" smtClean="0">
-                <a:ln>
-                  <a:solidFill>
-                    <a:srgbClr val="000000"/>
-                  </a:solidFill>
-                </a:ln>
-              </a:rPr>
-              <a:t>Dorg.exoplatform.container.configuration.debug</a:t>
-            </a:r>
-            <a:r>
-              <a:rPr lang="en-US" sz="2000" b="0" i="0" dirty="0" smtClean="0">
-                <a:ln>
-                  <a:solidFill>
-                    <a:srgbClr val="000000"/>
-                  </a:solidFill>
-                </a:ln>
-              </a:rPr>
-              <a:t>”</a:t>
-            </a:r>
-          </a:p>
-          <a:p>
-            <a:pPr marL="362426" indent="0">
-              <a:lnSpc>
-                <a:spcPct val="90000"/>
-              </a:lnSpc>
-              <a:buNone/>
-            </a:pPr>
-            <a:r>
-              <a:rPr lang="en-US" sz="2000" b="0" i="0" dirty="0" smtClean="0">
-                <a:ln>
-                  <a:solidFill>
-                    <a:srgbClr val="000000"/>
-                  </a:solidFill>
-                </a:ln>
-              </a:rPr>
-              <a:t> EXO_XML="-</a:t>
-            </a:r>
-            <a:r>
-              <a:rPr lang="en-US" sz="2000" b="0" i="0" dirty="0" err="1" smtClean="0">
-                <a:ln>
-                  <a:solidFill>
-                    <a:srgbClr val="000000"/>
-                  </a:solidFill>
-                </a:ln>
-              </a:rPr>
-              <a:t>Djavax.xml.stream.XMLOutputFactory</a:t>
-            </a:r>
-            <a:r>
-              <a:rPr lang="en-US" sz="2000" b="0" i="0" dirty="0" smtClean="0">
-                <a:ln>
-                  <a:solidFill>
-                    <a:srgbClr val="000000"/>
-                  </a:solidFill>
-                </a:ln>
-              </a:rPr>
-              <a:t>=</a:t>
-            </a:r>
-            <a:r>
-              <a:rPr lang="en-US" sz="2000" b="0" i="0" dirty="0" err="1" smtClean="0">
-                <a:ln>
-                  <a:solidFill>
-                    <a:srgbClr val="000000"/>
-                  </a:solidFill>
-                </a:ln>
-              </a:rPr>
-              <a:t>com.sun.xml.stream.ZephyrWriterFactory</a:t>
-            </a:r>
-            <a:r>
-              <a:rPr lang="en-US" sz="2000" b="0" i="0" dirty="0" smtClean="0">
-                <a:ln>
-                  <a:solidFill>
-                    <a:srgbClr val="000000"/>
-                  </a:solidFill>
-                </a:ln>
-              </a:rPr>
-              <a:t> -</a:t>
-            </a:r>
-            <a:r>
-              <a:rPr lang="en-US" sz="2000" b="0" i="0" dirty="0" err="1" smtClean="0">
-                <a:ln>
-                  <a:solidFill>
-                    <a:srgbClr val="000000"/>
-                  </a:solidFill>
-                </a:ln>
-              </a:rPr>
-              <a:t>Djavax.xml.stream.XMLInputFactory</a:t>
-            </a:r>
-            <a:r>
-              <a:rPr lang="en-US" sz="2000" b="0" i="0" dirty="0" smtClean="0">
-                <a:ln>
-                  <a:solidFill>
-                    <a:srgbClr val="000000"/>
-                  </a:solidFill>
-                </a:ln>
-              </a:rPr>
-              <a:t>=</a:t>
-            </a:r>
-            <a:r>
-              <a:rPr lang="en-US" sz="2000" b="0" i="0" dirty="0" err="1" smtClean="0">
-                <a:ln>
-                  <a:solidFill>
-                    <a:srgbClr val="000000"/>
-                  </a:solidFill>
-                </a:ln>
-              </a:rPr>
-              <a:t>com.sun.xml.stream.ZephyrParserFactory</a:t>
-            </a:r>
-            <a:r>
-              <a:rPr lang="en-US" sz="2000" b="0" i="0" dirty="0" smtClean="0">
-                <a:ln>
-                  <a:solidFill>
-                    <a:srgbClr val="000000"/>
-                  </a:solidFill>
-                </a:ln>
-              </a:rPr>
-              <a:t> -</a:t>
-            </a:r>
-            <a:r>
-              <a:rPr lang="en-US" sz="2000" b="0" i="0" dirty="0" err="1" smtClean="0">
-                <a:ln>
-                  <a:solidFill>
-                    <a:srgbClr val="000000"/>
-                  </a:solidFill>
-                </a:ln>
-              </a:rPr>
-              <a:t>Djavax.xml.stream.XMLEventFactory</a:t>
-            </a:r>
-            <a:r>
-              <a:rPr lang="en-US" sz="2000" b="0" i="0" dirty="0" smtClean="0">
-                <a:ln>
-                  <a:solidFill>
-                    <a:srgbClr val="000000"/>
-                  </a:solidFill>
-                </a:ln>
-              </a:rPr>
-              <a:t>=</a:t>
-            </a:r>
-            <a:r>
-              <a:rPr lang="en-US" sz="2000" b="0" i="0" dirty="0" err="1" smtClean="0">
-                <a:ln>
-                  <a:solidFill>
-                    <a:srgbClr val="000000"/>
-                  </a:solidFill>
-                </a:ln>
-              </a:rPr>
-              <a:t>com.sun.xml.stream.events.ZephyrEventFactory</a:t>
-            </a:r>
-            <a:r>
-              <a:rPr lang="en-US" sz="2000" b="0" i="0" dirty="0" smtClean="0">
-                <a:ln>
-                  <a:solidFill>
-                    <a:srgbClr val="000000"/>
-                  </a:solidFill>
-                </a:ln>
-              </a:rPr>
-              <a:t>" </a:t>
-            </a:r>
-          </a:p>
-          <a:p>
-            <a:pPr marL="362426" indent="0">
-              <a:lnSpc>
-                <a:spcPct val="90000"/>
-              </a:lnSpc>
-              <a:buNone/>
-            </a:pPr>
-            <a:r>
-              <a:rPr lang="en-US" sz="2000" b="0" i="0" dirty="0" smtClean="0">
-                <a:ln>
-                  <a:solidFill>
-                    <a:srgbClr val="000000"/>
-                  </a:solidFill>
-                </a:ln>
-              </a:rPr>
-              <a:t>JAVA_OPTS="$JAVA_OPTS $EXO_OPTS $EXO_PROFILES $EXO_XML”</a:t>
-            </a:r>
+            <a:endParaRPr lang="en-US" dirty="0"/>
           </a:p>
         </p:txBody>
       </p:sp>
     </p:spTree>
     <p:extLst>
       <p:ext uri="{BB962C8B-B14F-4D97-AF65-F5344CB8AC3E}">
-        <p14:creationId xmlns:p14="http://schemas.microsoft.com/office/powerpoint/2010/main" val="2234743320"/>
+        <p14:creationId xmlns:p14="http://schemas.microsoft.com/office/powerpoint/2010/main" val="3481134414"/>
       </p:ext>
     </p:extLst>
   </p:cSld>
@@ -21531,27 +21043,11 @@
           <a:p>
             <a:pPr eaLnBrk="1" hangingPunct="1"/>
             <a:r>
-              <a:rPr lang="en-US" dirty="0" smtClean="0"/>
-              <a:t>Installing </a:t>
-            </a:r>
-            <a:r>
-              <a:rPr lang="en-US" dirty="0" err="1" smtClean="0"/>
-              <a:t>eXo</a:t>
-            </a:r>
-            <a:r>
-              <a:rPr lang="en-US" dirty="0" smtClean="0"/>
-              <a:t> on </a:t>
-            </a:r>
-            <a:r>
-              <a:rPr lang="en-US" dirty="0" err="1" smtClean="0"/>
-              <a:t>JBoss</a:t>
-            </a:r>
-            <a:r>
-              <a:rPr lang="en-US" dirty="0" smtClean="0"/>
-              <a:t> EAP – JVM </a:t>
-            </a:r>
-            <a:r>
-              <a:rPr lang="en-US" dirty="0" err="1" smtClean="0"/>
+              <a:rPr lang="en-US" dirty="0"/>
+              <a:t>Installing eXo on JBoss EAP – JVM </a:t>
+            </a:r>
+            <a:r>
+              <a:rPr lang="en-US" dirty="0" err="1"/>
               <a:t>Params</a:t>
             </a:r>
             <a:endParaRPr lang="en-US" dirty="0" smtClean="0"/>
@@ -21626,11 +21122,11 @@
             </a:r>
             <a:r>
               <a:rPr lang="fr-FR" dirty="0" err="1" smtClean="0"/>
-              <a:t>run.conf.bat</a:t>
+              <a:t>run.conf</a:t>
             </a:r>
             <a:r>
               <a:rPr lang="fr-FR" dirty="0" smtClean="0"/>
-              <a:t> (Windows)</a:t>
+              <a:t> (Linux)</a:t>
             </a:r>
             <a:r>
               <a:rPr lang="en-US" dirty="0" smtClean="0"/>
@@ -21652,20 +21148,10 @@
                   </a:solidFill>
                 </a:ln>
               </a:rPr>
-              <a:t>set </a:t>
-            </a:r>
-            <a:r>
-              <a:rPr lang="en-US" sz="2000" b="0" i="0" dirty="0">
-                <a:ln>
-                  <a:solidFill>
-                    <a:srgbClr val="000000"/>
-                  </a:solidFill>
-                </a:ln>
-              </a:rPr>
-              <a:t>"EXO_PROFILES=-</a:t>
-            </a:r>
-            <a:r>
-              <a:rPr lang="en-US" sz="2000" b="0" i="0" dirty="0" err="1">
+              <a:t>EXO_PROFILES="-</a:t>
+            </a:r>
+            <a:r>
+              <a:rPr lang="en-US" sz="2000" b="0" i="0" dirty="0" err="1" smtClean="0">
                 <a:ln>
                   <a:solidFill>
                     <a:srgbClr val="000000"/>
@@ -21675,7 +21161,7 @@
               <a:t>Dexo.profiles</a:t>
             </a:r>
             <a:r>
-              <a:rPr lang="en-US" sz="2000" b="0" i="0" dirty="0">
+              <a:rPr lang="en-US" sz="2000" b="0" i="0" dirty="0" smtClean="0">
                 <a:ln>
                   <a:solidFill>
                     <a:srgbClr val="000000"/>
@@ -21684,13 +21170,6 @@
               </a:rPr>
               <a:t>=default" </a:t>
             </a:r>
-            <a:endParaRPr lang="en-US" sz="2000" b="0" i="0" dirty="0" smtClean="0">
-              <a:ln>
-                <a:solidFill>
-                  <a:srgbClr val="000000"/>
-                </a:solidFill>
-              </a:ln>
-            </a:endParaRPr>
           </a:p>
           <a:p>
             <a:pPr marL="362426" indent="0">
@@ -21707,20 +21186,10 @@
                   </a:solidFill>
                 </a:ln>
               </a:rPr>
-              <a:t>set </a:t>
-            </a:r>
-            <a:r>
-              <a:rPr lang="en-US" sz="2000" b="0" i="0" dirty="0">
-                <a:ln>
-                  <a:solidFill>
-                    <a:srgbClr val="000000"/>
-                  </a:solidFill>
-                </a:ln>
-              </a:rPr>
-              <a:t>"EXO_OPTS=-</a:t>
-            </a:r>
-            <a:r>
-              <a:rPr lang="en-US" sz="2000" b="0" i="0" dirty="0" err="1">
+              <a:t>EXO_OPTS="-</a:t>
+            </a:r>
+            <a:r>
+              <a:rPr lang="en-US" sz="2000" b="0" i="0" dirty="0" err="1" smtClean="0">
                 <a:ln>
                   <a:solidFill>
                     <a:srgbClr val="000000"/>
@@ -21730,7 +21199,7 @@
               <a:t>Dexo.product.developing</a:t>
             </a:r>
             <a:r>
-              <a:rPr lang="en-US" sz="2000" b="0" i="0" dirty="0">
+              <a:rPr lang="en-US" sz="2000" b="0" i="0" dirty="0" smtClean="0">
                 <a:ln>
                   <a:solidFill>
                     <a:srgbClr val="000000"/>
@@ -21740,7 +21209,7 @@
               <a:t>=false -</a:t>
             </a:r>
             <a:r>
-              <a:rPr lang="en-US" sz="2000" b="0" i="0" dirty="0" err="1">
+              <a:rPr lang="en-US" sz="2000" b="0" i="0" dirty="0" err="1" smtClean="0">
                 <a:ln>
                   <a:solidFill>
                     <a:srgbClr val="000000"/>
@@ -21750,7 +21219,7 @@
               <a:t>Dexo.conf.dir.name</a:t>
             </a:r>
             <a:r>
-              <a:rPr lang="en-US" sz="2000" b="0" i="0" dirty="0">
+              <a:rPr lang="en-US" sz="2000" b="0" i="0" dirty="0" smtClean="0">
                 <a:ln>
                   <a:solidFill>
                     <a:srgbClr val="000000"/>
@@ -21760,7 +21229,7 @@
               <a:t>=</a:t>
             </a:r>
             <a:r>
-              <a:rPr lang="en-US" sz="2000" b="0" i="0" dirty="0" err="1">
+              <a:rPr lang="en-US" sz="2000" b="0" i="0" dirty="0" err="1" smtClean="0">
                 <a:ln>
                   <a:solidFill>
                     <a:srgbClr val="000000"/>
@@ -21770,7 +21239,7 @@
               <a:t>gatein</a:t>
             </a:r>
             <a:r>
-              <a:rPr lang="en-US" sz="2000" b="0" i="0" dirty="0">
+              <a:rPr lang="en-US" sz="2000" b="0" i="0" dirty="0" smtClean="0">
                 <a:ln>
                   <a:solidFill>
                     <a:srgbClr val="000000"/>
@@ -21780,7 +21249,7 @@
               <a:t> -</a:t>
             </a:r>
             <a:r>
-              <a:rPr lang="en-US" sz="2000" b="0" i="0" dirty="0" err="1">
+              <a:rPr lang="en-US" sz="2000" b="0" i="0" dirty="0" err="1" smtClean="0">
                 <a:ln>
                   <a:solidFill>
                     <a:srgbClr val="000000"/>
@@ -21790,7 +21259,7 @@
               <a:t>Dgatein.data.dir</a:t>
             </a:r>
             <a:r>
-              <a:rPr lang="en-US" sz="2000" b="0" i="0" dirty="0">
+              <a:rPr lang="en-US" sz="2000" b="0" i="0" dirty="0" smtClean="0">
                 <a:ln>
                   <a:solidFill>
                     <a:srgbClr val="000000"/>
@@ -21800,7 +21269,7 @@
               <a:t>=../</a:t>
             </a:r>
             <a:r>
-              <a:rPr lang="en-US" sz="2000" b="0" i="0" dirty="0" err="1">
+              <a:rPr lang="en-US" sz="2000" b="0" i="0" dirty="0" err="1" smtClean="0">
                 <a:ln>
                   <a:solidFill>
                     <a:srgbClr val="000000"/>
@@ -21810,7 +21279,7 @@
               <a:t>gatein</a:t>
             </a:r>
             <a:r>
-              <a:rPr lang="en-US" sz="2000" b="0" i="0" dirty="0">
+              <a:rPr lang="en-US" sz="2000" b="0" i="0" dirty="0" smtClean="0">
                 <a:ln>
                   <a:solidFill>
                     <a:srgbClr val="000000"/>
@@ -21819,13 +21288,6 @@
               </a:rPr>
               <a:t>" </a:t>
             </a:r>
-            <a:endParaRPr lang="en-US" sz="2000" b="0" i="0" dirty="0" smtClean="0">
-              <a:ln>
-                <a:solidFill>
-                  <a:srgbClr val="000000"/>
-                </a:solidFill>
-              </a:ln>
-            </a:endParaRPr>
           </a:p>
           <a:p>
             <a:pPr marL="362426" indent="0">
@@ -21842,20 +21304,10 @@
                   </a:solidFill>
                 </a:ln>
               </a:rPr>
-              <a:t>set </a:t>
-            </a:r>
-            <a:r>
-              <a:rPr lang="en-US" sz="2000" b="0" i="0" dirty="0">
-                <a:ln>
-                  <a:solidFill>
-                    <a:srgbClr val="000000"/>
-                  </a:solidFill>
-                </a:ln>
-              </a:rPr>
-              <a:t>"REMOTE_DEBUG=-</a:t>
-            </a:r>
-            <a:r>
-              <a:rPr lang="en-US" sz="2000" b="0" i="0" dirty="0" err="1">
+              <a:t>REMOTE_DEBUG="-</a:t>
+            </a:r>
+            <a:r>
+              <a:rPr lang="en-US" sz="2000" b="0" i="0" dirty="0" err="1" smtClean="0">
                 <a:ln>
                   <a:solidFill>
                     <a:srgbClr val="000000"/>
@@ -21865,7 +21317,7 @@
               <a:t>Xdebug</a:t>
             </a:r>
             <a:r>
-              <a:rPr lang="en-US" sz="2000" b="0" i="0" dirty="0">
+              <a:rPr lang="en-US" sz="2000" b="0" i="0" dirty="0" smtClean="0">
                 <a:ln>
                   <a:solidFill>
                     <a:srgbClr val="000000"/>
@@ -21875,7 +21327,7 @@
               <a:t> -</a:t>
             </a:r>
             <a:r>
-              <a:rPr lang="en-US" sz="2000" b="0" i="0" dirty="0" err="1">
+              <a:rPr lang="en-US" sz="2000" b="0" i="0" dirty="0" err="1" smtClean="0">
                 <a:ln>
                   <a:solidFill>
                     <a:srgbClr val="000000"/>
@@ -21885,7 +21337,7 @@
               <a:t>Xrunjdwp:transport</a:t>
             </a:r>
             <a:r>
-              <a:rPr lang="en-US" sz="2000" b="0" i="0" dirty="0">
+              <a:rPr lang="en-US" sz="2000" b="0" i="0" dirty="0" smtClean="0">
                 <a:ln>
                   <a:solidFill>
                     <a:srgbClr val="000000"/>
@@ -21895,7 +21347,7 @@
               <a:t>=</a:t>
             </a:r>
             <a:r>
-              <a:rPr lang="en-US" sz="2000" b="0" i="0" dirty="0" err="1">
+              <a:rPr lang="en-US" sz="2000" b="0" i="0" dirty="0" err="1" smtClean="0">
                 <a:ln>
                   <a:solidFill>
                     <a:srgbClr val="000000"/>
@@ -21905,7 +21357,7 @@
               <a:t>dt_socket,address</a:t>
             </a:r>
             <a:r>
-              <a:rPr lang="en-US" sz="2000" b="0" i="0" dirty="0">
+              <a:rPr lang="en-US" sz="2000" b="0" i="0" dirty="0" smtClean="0">
                 <a:ln>
                   <a:solidFill>
                     <a:srgbClr val="000000"/>
@@ -21915,7 +21367,7 @@
               <a:t>=8000,server=</a:t>
             </a:r>
             <a:r>
-              <a:rPr lang="en-US" sz="2000" b="0" i="0" dirty="0" err="1">
+              <a:rPr lang="en-US" sz="2000" b="0" i="0" dirty="0" err="1" smtClean="0">
                 <a:ln>
                   <a:solidFill>
                     <a:srgbClr val="000000"/>
@@ -21925,7 +21377,7 @@
               <a:t>y,suspend</a:t>
             </a:r>
             <a:r>
-              <a:rPr lang="en-US" sz="2000" b="0" i="0" dirty="0">
+              <a:rPr lang="en-US" sz="2000" b="0" i="0" dirty="0" smtClean="0">
                 <a:ln>
                   <a:solidFill>
                     <a:srgbClr val="000000"/>
@@ -21935,7 +21387,7 @@
               <a:t>=n -</a:t>
             </a:r>
             <a:r>
-              <a:rPr lang="en-US" sz="2000" b="0" i="0" dirty="0" err="1">
+              <a:rPr lang="en-US" sz="2000" b="0" i="0" dirty="0" err="1" smtClean="0">
                 <a:ln>
                   <a:solidFill>
                     <a:srgbClr val="000000"/>
@@ -21945,7 +21397,7 @@
               <a:t>Dcom.sun.management.jmxremote</a:t>
             </a:r>
             <a:r>
-              <a:rPr lang="en-US" sz="2000" b="0" i="0" dirty="0">
+              <a:rPr lang="en-US" sz="2000" b="0" i="0" dirty="0" smtClean="0">
                 <a:ln>
                   <a:solidFill>
                     <a:srgbClr val="000000"/>
@@ -21955,7 +21407,7 @@
               <a:t> -</a:t>
             </a:r>
             <a:r>
-              <a:rPr lang="en-US" sz="2000" b="0" i="0" dirty="0" err="1">
+              <a:rPr lang="en-US" sz="2000" b="0" i="0" dirty="0" err="1" smtClean="0">
                 <a:ln>
                   <a:solidFill>
                     <a:srgbClr val="000000"/>
@@ -21965,7 +21417,145 @@
               <a:t>Dorg.exoplatform.container.configuration.debug</a:t>
             </a:r>
             <a:r>
-              <a:rPr lang="en-US" sz="2000" b="0" i="0" dirty="0">
+              <a:rPr lang="en-US" sz="2000" b="0" i="0" dirty="0" smtClean="0">
+                <a:ln>
+                  <a:solidFill>
+                    <a:srgbClr val="000000"/>
+                  </a:solidFill>
+                </a:ln>
+              </a:rPr>
+              <a:t>”</a:t>
+            </a:r>
+          </a:p>
+          <a:p>
+            <a:pPr marL="362426" indent="0">
+              <a:lnSpc>
+                <a:spcPct val="90000"/>
+              </a:lnSpc>
+              <a:buNone/>
+            </a:pPr>
+            <a:r>
+              <a:rPr lang="en-US" sz="2000" b="0" i="0" dirty="0" smtClean="0">
+                <a:ln>
+                  <a:solidFill>
+                    <a:srgbClr val="000000"/>
+                  </a:solidFill>
+                </a:ln>
+              </a:rPr>
+              <a:t> EXO_XML="-</a:t>
+            </a:r>
+            <a:r>
+              <a:rPr lang="en-US" sz="2000" b="0" i="0" dirty="0" err="1" smtClean="0">
+                <a:ln>
+                  <a:solidFill>
+                    <a:srgbClr val="000000"/>
+                  </a:solidFill>
+                </a:ln>
+              </a:rPr>
+              <a:t>Djavax.xml.stream.XMLOutputFactory</a:t>
+            </a:r>
+            <a:r>
+              <a:rPr lang="en-US" sz="2000" b="0" i="0" dirty="0" smtClean="0">
+                <a:ln>
+                  <a:solidFill>
+                    <a:srgbClr val="000000"/>
+                  </a:solidFill>
+                </a:ln>
+              </a:rPr>
+              <a:t>=</a:t>
+            </a:r>
+            <a:r>
+              <a:rPr lang="en-US" sz="2000" b="0" i="0" dirty="0" err="1" smtClean="0">
+                <a:ln>
+                  <a:solidFill>
+                    <a:srgbClr val="000000"/>
+                  </a:solidFill>
+                </a:ln>
+              </a:rPr>
+              <a:t>com.sun.xml.stream.ZephyrWriterFactory</a:t>
+            </a:r>
+            <a:r>
+              <a:rPr lang="en-US" sz="2000" b="0" i="0" dirty="0" smtClean="0">
+                <a:ln>
+                  <a:solidFill>
+                    <a:srgbClr val="000000"/>
+                  </a:solidFill>
+                </a:ln>
+              </a:rPr>
+              <a:t> -</a:t>
+            </a:r>
+            <a:r>
+              <a:rPr lang="en-US" sz="2000" b="0" i="0" dirty="0" err="1" smtClean="0">
+                <a:ln>
+                  <a:solidFill>
+                    <a:srgbClr val="000000"/>
+                  </a:solidFill>
+                </a:ln>
+              </a:rPr>
+              <a:t>Djavax.xml.stream.XMLInputFactory</a:t>
+            </a:r>
+            <a:r>
+              <a:rPr lang="en-US" sz="2000" b="0" i="0" dirty="0" smtClean="0">
+                <a:ln>
+                  <a:solidFill>
+                    <a:srgbClr val="000000"/>
+                  </a:solidFill>
+                </a:ln>
+              </a:rPr>
+              <a:t>=</a:t>
+            </a:r>
+            <a:r>
+              <a:rPr lang="en-US" sz="2000" b="0" i="0" dirty="0" err="1" smtClean="0">
+                <a:ln>
+                  <a:solidFill>
+                    <a:srgbClr val="000000"/>
+                  </a:solidFill>
+                </a:ln>
+              </a:rPr>
+              <a:t>com.sun.xml.stream.ZephyrParserFactory</a:t>
+            </a:r>
+            <a:r>
+              <a:rPr lang="en-US" sz="2000" b="0" i="0" dirty="0" smtClean="0">
+                <a:ln>
+                  <a:solidFill>
+                    <a:srgbClr val="000000"/>
+                  </a:solidFill>
+                </a:ln>
+              </a:rPr>
+              <a:t> -</a:t>
+            </a:r>
+            <a:r>
+              <a:rPr lang="en-US" sz="2000" b="0" i="0" dirty="0" err="1" smtClean="0">
+                <a:ln>
+                  <a:solidFill>
+                    <a:srgbClr val="000000"/>
+                  </a:solidFill>
+                </a:ln>
+              </a:rPr>
+              <a:t>Djavax.xml.stream.XMLEventFactory</a:t>
+            </a:r>
+            <a:r>
+              <a:rPr lang="en-US" sz="2000" b="0" i="0" dirty="0" smtClean="0">
+                <a:ln>
+                  <a:solidFill>
+                    <a:srgbClr val="000000"/>
+                  </a:solidFill>
+                </a:ln>
+              </a:rPr>
+              <a:t>=</a:t>
+            </a:r>
+            <a:r>
+              <a:rPr lang="en-US" sz="2000" b="0" i="0" dirty="0" err="1" smtClean="0">
+                <a:ln>
+                  <a:solidFill>
+                    <a:srgbClr val="000000"/>
+                  </a:solidFill>
+                </a:ln>
+              </a:rPr>
+              <a:t>com.sun.xml.stream.events.ZephyrEventFactory</a:t>
+            </a:r>
+            <a:r>
+              <a:rPr lang="en-US" sz="2000" b="0" i="0" dirty="0" smtClean="0">
                 <a:ln>
                   <a:solidFill>
                     <a:srgbClr val="000000"/>
@@ -21974,13 +21564,6 @@
               </a:rPr>
               <a:t>" </a:t>
             </a:r>
-            <a:endParaRPr lang="en-US" sz="2000" b="0" i="0" dirty="0" smtClean="0">
-              <a:ln>
-                <a:solidFill>
-                  <a:srgbClr val="000000"/>
-                </a:solidFill>
-              </a:ln>
-            </a:endParaRPr>
           </a:p>
           <a:p>
             <a:pPr marL="362426" indent="0">
@@ -21997,187 +21580,15 @@
                   </a:solidFill>
                 </a:ln>
               </a:rPr>
-              <a:t>set </a:t>
-            </a:r>
-            <a:r>
-              <a:rPr lang="en-US" sz="2000" b="0" i="0" dirty="0">
-                <a:ln>
-                  <a:solidFill>
-                    <a:srgbClr val="000000"/>
-                  </a:solidFill>
-                </a:ln>
-              </a:rPr>
-              <a:t>"EXO_XML=-</a:t>
-            </a:r>
-            <a:r>
-              <a:rPr lang="en-US" sz="2000" b="0" i="0" dirty="0" err="1">
-                <a:ln>
-                  <a:solidFill>
-                    <a:srgbClr val="000000"/>
-                  </a:solidFill>
-                </a:ln>
-              </a:rPr>
-              <a:t>Djavax.xml.stream.XMLOutputFactory</a:t>
-            </a:r>
-            <a:r>
-              <a:rPr lang="en-US" sz="2000" b="0" i="0" dirty="0">
-                <a:ln>
-                  <a:solidFill>
-                    <a:srgbClr val="000000"/>
-                  </a:solidFill>
-                </a:ln>
-              </a:rPr>
-              <a:t>=</a:t>
-            </a:r>
-            <a:r>
-              <a:rPr lang="en-US" sz="2000" b="0" i="0" dirty="0" err="1">
-                <a:ln>
-                  <a:solidFill>
-                    <a:srgbClr val="000000"/>
-                  </a:solidFill>
-                </a:ln>
-              </a:rPr>
-              <a:t>com.sun.xml.stream.ZephyrWriterFactory</a:t>
-            </a:r>
-            <a:r>
-              <a:rPr lang="en-US" sz="2000" b="0" i="0" dirty="0">
-                <a:ln>
-                  <a:solidFill>
-                    <a:srgbClr val="000000"/>
-                  </a:solidFill>
-                </a:ln>
-              </a:rPr>
-              <a:t> -</a:t>
-            </a:r>
-            <a:r>
-              <a:rPr lang="en-US" sz="2000" b="0" i="0" dirty="0" err="1">
-                <a:ln>
-                  <a:solidFill>
-                    <a:srgbClr val="000000"/>
-                  </a:solidFill>
-                </a:ln>
-              </a:rPr>
-              <a:t>Djavax.xml.stream.XMLInputFactory</a:t>
-            </a:r>
-            <a:r>
-              <a:rPr lang="en-US" sz="2000" b="0" i="0" dirty="0">
-                <a:ln>
-                  <a:solidFill>
-                    <a:srgbClr val="000000"/>
-                  </a:solidFill>
-                </a:ln>
-              </a:rPr>
-              <a:t>=</a:t>
-            </a:r>
-            <a:r>
-              <a:rPr lang="en-US" sz="2000" b="0" i="0" dirty="0" err="1">
-                <a:ln>
-                  <a:solidFill>
-                    <a:srgbClr val="000000"/>
-                  </a:solidFill>
-                </a:ln>
-              </a:rPr>
-              <a:t>com.sun.xml.stream.ZephyrParserFactory</a:t>
-            </a:r>
-            <a:r>
-              <a:rPr lang="en-US" sz="2000" b="0" i="0" dirty="0">
-                <a:ln>
-                  <a:solidFill>
-                    <a:srgbClr val="000000"/>
-                  </a:solidFill>
-                </a:ln>
-              </a:rPr>
-              <a:t> -</a:t>
-            </a:r>
-            <a:r>
-              <a:rPr lang="en-US" sz="2000" b="0" i="0" dirty="0" err="1">
-                <a:ln>
-                  <a:solidFill>
-                    <a:srgbClr val="000000"/>
-                  </a:solidFill>
-                </a:ln>
-              </a:rPr>
-              <a:t>Djavax.xml.stream.XMLEventFactory</a:t>
-            </a:r>
-            <a:r>
-              <a:rPr lang="en-US" sz="2000" b="0" i="0" dirty="0">
-                <a:ln>
-                  <a:solidFill>
-                    <a:srgbClr val="000000"/>
-                  </a:solidFill>
-                </a:ln>
-              </a:rPr>
-              <a:t>=</a:t>
-            </a:r>
-            <a:r>
-              <a:rPr lang="en-US" sz="2000" b="0" i="0" dirty="0" err="1">
-                <a:ln>
-                  <a:solidFill>
-                    <a:srgbClr val="000000"/>
-                  </a:solidFill>
-                </a:ln>
-              </a:rPr>
-              <a:t>com.sun.xml.stream.events.ZephyrEventFactory</a:t>
-            </a:r>
-            <a:r>
-              <a:rPr lang="en-US" sz="2000" b="0" i="0" dirty="0">
-                <a:ln>
-                  <a:solidFill>
-                    <a:srgbClr val="000000"/>
-                  </a:solidFill>
-                </a:ln>
-              </a:rPr>
-              <a:t>" </a:t>
-            </a:r>
-            <a:endParaRPr lang="en-US" sz="2000" b="0" i="0" dirty="0" smtClean="0">
-              <a:ln>
-                <a:solidFill>
-                  <a:srgbClr val="000000"/>
-                </a:solidFill>
-              </a:ln>
-            </a:endParaRPr>
-          </a:p>
-          <a:p>
-            <a:pPr marL="362426" indent="0">
-              <a:lnSpc>
-                <a:spcPct val="90000"/>
-              </a:lnSpc>
-              <a:buNone/>
-            </a:pPr>
-            <a:r>
-              <a:rPr lang="en-US" sz="2000" b="0" i="0" dirty="0" smtClean="0">
-                <a:ln>
-                  <a:solidFill>
-                    <a:srgbClr val="000000"/>
-                  </a:solidFill>
-                </a:ln>
-              </a:rPr>
-              <a:t>set </a:t>
-            </a:r>
-            <a:r>
-              <a:rPr lang="en-US" sz="2000" b="0" i="0" dirty="0">
-                <a:ln>
-                  <a:solidFill>
-                    <a:srgbClr val="000000"/>
-                  </a:solidFill>
-                </a:ln>
-              </a:rPr>
-              <a:t>"JAVA_OPTS=%JAVA_OPTS% %EXO_OPTS% %EXO_PROFILES% %EXO_XML%" </a:t>
-            </a:r>
-            <a:endParaRPr lang="en-US" sz="2000" b="0" i="0" dirty="0" smtClean="0">
-              <a:ln>
-                <a:solidFill>
-                  <a:srgbClr val="000000"/>
-                </a:solidFill>
-              </a:ln>
-            </a:endParaRPr>
+              <a:t>JAVA_OPTS="$JAVA_OPTS $EXO_OPTS $EXO_PROFILES $EXO_XML”</a:t>
+            </a:r>
           </a:p>
         </p:txBody>
       </p:sp>
     </p:spTree>
     <p:extLst>
       <p:ext uri="{BB962C8B-B14F-4D97-AF65-F5344CB8AC3E}">
-        <p14:creationId xmlns:p14="http://schemas.microsoft.com/office/powerpoint/2010/main" val="2902699330"/>
+        <p14:creationId xmlns:p14="http://schemas.microsoft.com/office/powerpoint/2010/main" val="2234743320"/>
       </p:ext>
     </p:extLst>
   </p:cSld>
@@ -22265,7 +21676,6 @@
               <a:rPr lang="en-US" dirty="0" smtClean="0"/>
               <a:t>Documentation</a:t>
             </a:r>
-            <a:endParaRPr lang="en-US" dirty="0" smtClean="0"/>
           </a:p>
           <a:p>
             <a:pPr marL="584962" lvl="1" indent="-219361"/>
@@ -22278,13 +21688,8 @@
             <a:pPr marL="584962" lvl="1" indent="-219361"/>
             <a:r>
               <a:rPr lang="en-US" dirty="0" smtClean="0"/>
-              <a:t>Installation and Starting on </a:t>
-            </a:r>
-            <a:r>
-              <a:rPr lang="en-US" dirty="0" smtClean="0"/>
-              <a:t>Tomcat and start options</a:t>
-            </a:r>
-            <a:endParaRPr lang="en-US" dirty="0" smtClean="0"/>
+              <a:t>Installation and Starting on Tomcat and start options</a:t>
+            </a:r>
           </a:p>
           <a:p>
             <a:pPr marL="584962" lvl="1" indent="-219361"/>
@@ -22293,24 +21698,19 @@
               <a:t>Installation and Starting on </a:t>
             </a:r>
             <a:r>
-              <a:rPr lang="en-US" dirty="0" err="1" smtClean="0"/>
-              <a:t>Jboss</a:t>
-            </a:r>
-            <a:r>
               <a:rPr lang="en-US" dirty="0" smtClean="0"/>
-              <a:t> and start options</a:t>
-            </a:r>
-            <a:endParaRPr lang="en-US" dirty="0" smtClean="0"/>
+              <a:t>JBoss </a:t>
+            </a:r>
+            <a:r>
+              <a:rPr lang="en-US" dirty="0" smtClean="0"/>
+              <a:t>and start options</a:t>
+            </a:r>
           </a:p>
           <a:p>
             <a:pPr marL="584962" lvl="1" indent="-219361"/>
             <a:r>
-              <a:rPr lang="en-US" dirty="0" err="1" smtClean="0"/>
-              <a:t>eXo</a:t>
-            </a:r>
-            <a:r>
               <a:rPr lang="en-US" dirty="0" smtClean="0"/>
-              <a:t> Profiles</a:t>
+              <a:t>eXo Profiles</a:t>
             </a:r>
             <a:endParaRPr lang="en-US" dirty="0"/>
           </a:p>
@@ -22377,24 +21777,13 @@
             <a:pPr eaLnBrk="1" hangingPunct="1"/>
             <a:r>
               <a:rPr lang="en-US" dirty="0" smtClean="0"/>
-              <a:t>Installing </a:t>
+              <a:t>Installing eXo on JBoss EAP – JVM </a:t>
             </a:r>
             <a:r>
               <a:rPr lang="en-US" dirty="0" err="1" smtClean="0"/>
-              <a:t>eXo</a:t>
-            </a:r>
-            <a:r>
-              <a:rPr lang="en-US" dirty="0" smtClean="0"/>
-              <a:t> on </a:t>
-            </a:r>
-            <a:r>
-              <a:rPr lang="en-US" dirty="0" err="1" smtClean="0"/>
-              <a:t>JBoss</a:t>
-            </a:r>
-            <a:r>
-              <a:rPr lang="en-US" dirty="0" smtClean="0"/>
-              <a:t> EAP – Logging </a:t>
-            </a:r>
+              <a:t>Params</a:t>
+            </a:r>
+            <a:endParaRPr lang="en-US" dirty="0" smtClean="0"/>
           </a:p>
         </p:txBody>
       </p:sp>
@@ -22411,7 +21800,7 @@
         <p:spPr>
           <a:xfrm>
             <a:off x="507964" y="1350945"/>
-            <a:ext cx="10179255" cy="5089000"/>
+            <a:ext cx="10400690" cy="5089000"/>
           </a:xfrm>
         </p:spPr>
         <p:txBody>
@@ -22419,199 +21808,605 @@
           <a:lstStyle/>
           <a:p>
             <a:pPr marL="219361" indent="-216749">
+              <a:lnSpc>
+                <a:spcPct val="90000"/>
+              </a:lnSpc>
               <a:buNone/>
             </a:pPr>
             <a:r>
-              <a:rPr lang="fr-FR" dirty="0" err="1"/>
+              <a:rPr lang="fr-FR" dirty="0" err="1" smtClean="0"/>
               <a:t>Add</a:t>
             </a:r>
             <a:r>
-              <a:rPr lang="fr-FR" dirty="0"/>
+              <a:rPr lang="fr-FR" dirty="0" smtClean="0"/>
               <a:t> </a:t>
             </a:r>
             <a:r>
+              <a:rPr lang="fr-FR" dirty="0" err="1" smtClean="0"/>
+              <a:t>these</a:t>
+            </a:r>
+            <a:r>
               <a:rPr lang="fr-FR" dirty="0" smtClean="0"/>
-              <a:t>to </a:t>
+              <a:t> </a:t>
             </a:r>
             <a:r>
               <a:rPr lang="fr-FR" dirty="0" err="1" smtClean="0"/>
-              <a:t>jboss</a:t>
-            </a:r>
-            <a:r>
-              <a:rPr lang="fr-FR" dirty="0" err="1"/>
-              <a:t>-root</a:t>
-            </a:r>
-            <a:r>
-              <a:rPr lang="fr-FR" dirty="0"/>
-              <a:t>/server/default/</a:t>
-            </a:r>
-            <a:r>
-              <a:rPr lang="fr-FR" dirty="0" err="1"/>
-              <a:t>conf</a:t>
-            </a:r>
-            <a:r>
-              <a:rPr lang="fr-FR" dirty="0"/>
-              <a:t>/jboss-</a:t>
+              <a:t>lines</a:t>
             </a:r>
             <a:r>
               <a:rPr lang="fr-FR" dirty="0" smtClean="0"/>
-              <a:t>log4j.xml</a:t>
+              <a:t> </a:t>
+            </a:r>
+            <a:r>
+              <a:rPr lang="fr-FR" dirty="0" err="1" smtClean="0"/>
+              <a:t>at</a:t>
+            </a:r>
+            <a:r>
+              <a:rPr lang="fr-FR" dirty="0" smtClean="0"/>
+              <a:t> the end of </a:t>
+            </a:r>
+            <a:r>
+              <a:rPr lang="fr-FR" dirty="0" err="1" smtClean="0"/>
+              <a:t>jboss-root</a:t>
+            </a:r>
+            <a:r>
+              <a:rPr lang="fr-FR" dirty="0" smtClean="0"/>
+              <a:t>/bin/</a:t>
+            </a:r>
+            <a:r>
+              <a:rPr lang="fr-FR" dirty="0" err="1" smtClean="0"/>
+              <a:t>run.conf.bat</a:t>
+            </a:r>
+            <a:r>
+              <a:rPr lang="fr-FR" dirty="0" smtClean="0"/>
+              <a:t> (Windows)</a:t>
             </a:r>
             <a:r>
               <a:rPr lang="en-US" dirty="0" smtClean="0"/>
               <a:t>:</a:t>
             </a:r>
-            <a:endParaRPr lang="en-US" dirty="0"/>
-          </a:p>
-          <a:p>
-            <a:pPr marL="584962" lvl="1" indent="-219361"/>
-            <a:r>
-              <a:rPr lang="en-US" i="0" dirty="0"/>
-              <a:t>&lt;!-- Limit the JSR170 categories --&gt; </a:t>
-            </a:r>
-            <a:r>
-              <a:rPr lang="en-US" i="0" dirty="0" smtClean="0"/>
-              <a:t/>
-            </a:r>
-            <a:br>
-              <a:rPr lang="en-US" i="0" dirty="0" smtClean="0"/>
-            </a:br>
-            <a:r>
-              <a:rPr lang="en-US" i="0" dirty="0" smtClean="0"/>
-              <a:t>&lt;</a:t>
-            </a:r>
-            <a:r>
-              <a:rPr lang="en-US" i="0" dirty="0"/>
-              <a:t>category name="</a:t>
-            </a:r>
-            <a:r>
-              <a:rPr lang="en-US" i="0" dirty="0" err="1"/>
-              <a:t>exo.jcr</a:t>
-            </a:r>
-            <a:r>
-              <a:rPr lang="en-US" i="0" dirty="0"/>
-              <a:t>"&gt; </a:t>
-            </a:r>
-            <a:r>
-              <a:rPr lang="en-US" i="0" dirty="0" smtClean="0"/>
-              <a:t/>
-            </a:r>
-            <a:br>
-              <a:rPr lang="en-US" i="0" dirty="0" smtClean="0"/>
-            </a:br>
-            <a:r>
-              <a:rPr lang="en-US" i="0" dirty="0" smtClean="0"/>
-              <a:t>	&lt;</a:t>
-            </a:r>
-            <a:r>
-              <a:rPr lang="en-US" i="0" dirty="0"/>
-              <a:t>priority value="INFO"/&gt; </a:t>
-            </a:r>
-            <a:r>
-              <a:rPr lang="en-US" i="0" dirty="0" smtClean="0"/>
-              <a:t/>
-            </a:r>
-            <a:br>
-              <a:rPr lang="en-US" i="0" dirty="0" smtClean="0"/>
-            </a:br>
-            <a:r>
-              <a:rPr lang="en-US" i="0" dirty="0" smtClean="0"/>
-              <a:t>&lt;</a:t>
-            </a:r>
-            <a:r>
-              <a:rPr lang="en-US" i="0" dirty="0"/>
-              <a:t>/category&gt; </a:t>
-            </a:r>
-            <a:endParaRPr lang="en-US" i="0" dirty="0" smtClean="0"/>
-          </a:p>
-          <a:p>
-            <a:pPr marL="584962" lvl="1" indent="-219361"/>
-            <a:r>
-              <a:rPr lang="en-US" i="0" dirty="0" smtClean="0"/>
-              <a:t/>
-            </a:r>
-            <a:br>
-              <a:rPr lang="en-US" i="0" dirty="0" smtClean="0"/>
-            </a:br>
-            <a:r>
-              <a:rPr lang="en-US" i="0" dirty="0" smtClean="0"/>
-              <a:t>&lt;</a:t>
-            </a:r>
-            <a:r>
-              <a:rPr lang="en-US" i="0" dirty="0"/>
-              <a:t>!-- Limit the JSR-168 and JSR-286 categories --</a:t>
-            </a:r>
-            <a:r>
-              <a:rPr lang="en-US" i="0" dirty="0" smtClean="0"/>
-              <a:t>&gt;</a:t>
-            </a:r>
-            <a:br>
-              <a:rPr lang="en-US" i="0" dirty="0" smtClean="0"/>
-            </a:br>
-            <a:r>
-              <a:rPr lang="en-US" i="0" dirty="0" smtClean="0"/>
-              <a:t> </a:t>
-            </a:r>
-            <a:r>
-              <a:rPr lang="en-US" i="0" dirty="0"/>
-              <a:t>&lt;category name="</a:t>
-            </a:r>
-            <a:r>
-              <a:rPr lang="en-US" i="0" dirty="0" err="1"/>
-              <a:t>org.exoplatform.services</a:t>
-            </a:r>
-            <a:r>
-              <a:rPr lang="en-US" i="0" dirty="0"/>
-              <a:t>"&gt; </a:t>
-            </a:r>
-            <a:r>
-              <a:rPr lang="en-US" i="0" dirty="0" smtClean="0"/>
-              <a:t/>
-            </a:r>
-            <a:br>
-              <a:rPr lang="en-US" i="0" dirty="0" smtClean="0"/>
-            </a:br>
-            <a:r>
-              <a:rPr lang="en-US" i="0" dirty="0" smtClean="0"/>
-              <a:t>	&lt;</a:t>
-            </a:r>
-            <a:r>
-              <a:rPr lang="en-US" i="0" dirty="0"/>
-              <a:t>priority value="INFO"/&gt; </a:t>
-            </a:r>
-            <a:r>
-              <a:rPr lang="en-US" i="0" dirty="0" smtClean="0"/>
-              <a:t/>
-            </a:r>
-            <a:br>
-              <a:rPr lang="en-US" i="0" dirty="0" smtClean="0"/>
-            </a:br>
-            <a:r>
-              <a:rPr lang="en-US" i="0" dirty="0" smtClean="0"/>
-              <a:t>&lt;</a:t>
-            </a:r>
-            <a:r>
-              <a:rPr lang="en-US" i="0" dirty="0"/>
-              <a:t>/category</a:t>
-            </a:r>
-            <a:r>
-              <a:rPr lang="en-US" i="0" dirty="0" smtClean="0"/>
-              <a:t>&gt;</a:t>
-            </a:r>
-            <a:endParaRPr lang="en-US" i="0" dirty="0"/>
-          </a:p>
-          <a:p>
-            <a:pPr marL="365601" lvl="1" indent="0">
+          </a:p>
+          <a:p>
+            <a:pPr marL="362426" indent="0">
+              <a:lnSpc>
+                <a:spcPct val="90000"/>
+              </a:lnSpc>
               <a:buNone/>
             </a:pPr>
-            <a:endParaRPr lang="en-US" dirty="0"/>
+            <a:r>
+              <a:rPr lang="en-US" sz="2000" b="0" i="0" dirty="0" smtClean="0">
+                <a:ln>
+                  <a:solidFill>
+                    <a:srgbClr val="000000"/>
+                  </a:solidFill>
+                </a:ln>
+              </a:rPr>
+              <a:t>set </a:t>
+            </a:r>
+            <a:r>
+              <a:rPr lang="en-US" sz="2000" b="0" i="0" dirty="0">
+                <a:ln>
+                  <a:solidFill>
+                    <a:srgbClr val="000000"/>
+                  </a:solidFill>
+                </a:ln>
+              </a:rPr>
+              <a:t>"EXO_PROFILES=-</a:t>
+            </a:r>
+            <a:r>
+              <a:rPr lang="en-US" sz="2000" b="0" i="0" dirty="0" err="1">
+                <a:ln>
+                  <a:solidFill>
+                    <a:srgbClr val="000000"/>
+                  </a:solidFill>
+                </a:ln>
+              </a:rPr>
+              <a:t>Dexo.profiles</a:t>
+            </a:r>
+            <a:r>
+              <a:rPr lang="en-US" sz="2000" b="0" i="0" dirty="0">
+                <a:ln>
+                  <a:solidFill>
+                    <a:srgbClr val="000000"/>
+                  </a:solidFill>
+                </a:ln>
+              </a:rPr>
+              <a:t>=default" </a:t>
+            </a:r>
+            <a:endParaRPr lang="en-US" sz="2000" b="0" i="0" dirty="0" smtClean="0">
+              <a:ln>
+                <a:solidFill>
+                  <a:srgbClr val="000000"/>
+                </a:solidFill>
+              </a:ln>
+            </a:endParaRPr>
+          </a:p>
+          <a:p>
+            <a:pPr marL="362426" indent="0">
+              <a:lnSpc>
+                <a:spcPct val="90000"/>
+              </a:lnSpc>
+              <a:buNone/>
+            </a:pPr>
+            <a:r>
+              <a:rPr lang="en-US" sz="2000" b="0" i="0" dirty="0" smtClean="0">
+                <a:ln>
+                  <a:solidFill>
+                    <a:srgbClr val="000000"/>
+                  </a:solidFill>
+                </a:ln>
+              </a:rPr>
+              <a:t>set </a:t>
+            </a:r>
+            <a:r>
+              <a:rPr lang="en-US" sz="2000" b="0" i="0" dirty="0">
+                <a:ln>
+                  <a:solidFill>
+                    <a:srgbClr val="000000"/>
+                  </a:solidFill>
+                </a:ln>
+              </a:rPr>
+              <a:t>"EXO_OPTS=-</a:t>
+            </a:r>
+            <a:r>
+              <a:rPr lang="en-US" sz="2000" b="0" i="0" dirty="0" err="1">
+                <a:ln>
+                  <a:solidFill>
+                    <a:srgbClr val="000000"/>
+                  </a:solidFill>
+                </a:ln>
+              </a:rPr>
+              <a:t>Dexo.product.developing</a:t>
+            </a:r>
+            <a:r>
+              <a:rPr lang="en-US" sz="2000" b="0" i="0" dirty="0">
+                <a:ln>
+                  <a:solidFill>
+                    <a:srgbClr val="000000"/>
+                  </a:solidFill>
+                </a:ln>
+              </a:rPr>
+              <a:t>=false -</a:t>
+            </a:r>
+            <a:r>
+              <a:rPr lang="en-US" sz="2000" b="0" i="0" dirty="0" err="1">
+                <a:ln>
+                  <a:solidFill>
+                    <a:srgbClr val="000000"/>
+                  </a:solidFill>
+                </a:ln>
+              </a:rPr>
+              <a:t>Dexo.conf.dir.name</a:t>
+            </a:r>
+            <a:r>
+              <a:rPr lang="en-US" sz="2000" b="0" i="0" dirty="0">
+                <a:ln>
+                  <a:solidFill>
+                    <a:srgbClr val="000000"/>
+                  </a:solidFill>
+                </a:ln>
+              </a:rPr>
+              <a:t>=</a:t>
+            </a:r>
+            <a:r>
+              <a:rPr lang="en-US" sz="2000" b="0" i="0" dirty="0" err="1">
+                <a:ln>
+                  <a:solidFill>
+                    <a:srgbClr val="000000"/>
+                  </a:solidFill>
+                </a:ln>
+              </a:rPr>
+              <a:t>gatein</a:t>
+            </a:r>
+            <a:r>
+              <a:rPr lang="en-US" sz="2000" b="0" i="0" dirty="0">
+                <a:ln>
+                  <a:solidFill>
+                    <a:srgbClr val="000000"/>
+                  </a:solidFill>
+                </a:ln>
+              </a:rPr>
+              <a:t> -</a:t>
+            </a:r>
+            <a:r>
+              <a:rPr lang="en-US" sz="2000" b="0" i="0" dirty="0" err="1">
+                <a:ln>
+                  <a:solidFill>
+                    <a:srgbClr val="000000"/>
+                  </a:solidFill>
+                </a:ln>
+              </a:rPr>
+              <a:t>Dgatein.data.dir</a:t>
+            </a:r>
+            <a:r>
+              <a:rPr lang="en-US" sz="2000" b="0" i="0" dirty="0">
+                <a:ln>
+                  <a:solidFill>
+                    <a:srgbClr val="000000"/>
+                  </a:solidFill>
+                </a:ln>
+              </a:rPr>
+              <a:t>=../</a:t>
+            </a:r>
+            <a:r>
+              <a:rPr lang="en-US" sz="2000" b="0" i="0" dirty="0" err="1">
+                <a:ln>
+                  <a:solidFill>
+                    <a:srgbClr val="000000"/>
+                  </a:solidFill>
+                </a:ln>
+              </a:rPr>
+              <a:t>gatein</a:t>
+            </a:r>
+            <a:r>
+              <a:rPr lang="en-US" sz="2000" b="0" i="0" dirty="0">
+                <a:ln>
+                  <a:solidFill>
+                    <a:srgbClr val="000000"/>
+                  </a:solidFill>
+                </a:ln>
+              </a:rPr>
+              <a:t>" </a:t>
+            </a:r>
+            <a:endParaRPr lang="en-US" sz="2000" b="0" i="0" dirty="0" smtClean="0">
+              <a:ln>
+                <a:solidFill>
+                  <a:srgbClr val="000000"/>
+                </a:solidFill>
+              </a:ln>
+            </a:endParaRPr>
+          </a:p>
+          <a:p>
+            <a:pPr marL="362426" indent="0">
+              <a:lnSpc>
+                <a:spcPct val="90000"/>
+              </a:lnSpc>
+              <a:buNone/>
+            </a:pPr>
+            <a:r>
+              <a:rPr lang="en-US" sz="2000" b="0" i="0" dirty="0" smtClean="0">
+                <a:ln>
+                  <a:solidFill>
+                    <a:srgbClr val="000000"/>
+                  </a:solidFill>
+                </a:ln>
+              </a:rPr>
+              <a:t>set </a:t>
+            </a:r>
+            <a:r>
+              <a:rPr lang="en-US" sz="2000" b="0" i="0" dirty="0">
+                <a:ln>
+                  <a:solidFill>
+                    <a:srgbClr val="000000"/>
+                  </a:solidFill>
+                </a:ln>
+              </a:rPr>
+              <a:t>"REMOTE_DEBUG=-</a:t>
+            </a:r>
+            <a:r>
+              <a:rPr lang="en-US" sz="2000" b="0" i="0" dirty="0" err="1">
+                <a:ln>
+                  <a:solidFill>
+                    <a:srgbClr val="000000"/>
+                  </a:solidFill>
+                </a:ln>
+              </a:rPr>
+              <a:t>Xdebug</a:t>
+            </a:r>
+            <a:r>
+              <a:rPr lang="en-US" sz="2000" b="0" i="0" dirty="0">
+                <a:ln>
+                  <a:solidFill>
+                    <a:srgbClr val="000000"/>
+                  </a:solidFill>
+                </a:ln>
+              </a:rPr>
+              <a:t> -</a:t>
+            </a:r>
+            <a:r>
+              <a:rPr lang="en-US" sz="2000" b="0" i="0" dirty="0" err="1">
+                <a:ln>
+                  <a:solidFill>
+                    <a:srgbClr val="000000"/>
+                  </a:solidFill>
+                </a:ln>
+              </a:rPr>
+              <a:t>Xrunjdwp:transport</a:t>
+            </a:r>
+            <a:r>
+              <a:rPr lang="en-US" sz="2000" b="0" i="0" dirty="0">
+                <a:ln>
+                  <a:solidFill>
+                    <a:srgbClr val="000000"/>
+                  </a:solidFill>
+                </a:ln>
+              </a:rPr>
+              <a:t>=</a:t>
+            </a:r>
+            <a:r>
+              <a:rPr lang="en-US" sz="2000" b="0" i="0" dirty="0" err="1">
+                <a:ln>
+                  <a:solidFill>
+                    <a:srgbClr val="000000"/>
+                  </a:solidFill>
+                </a:ln>
+              </a:rPr>
+              <a:t>dt_socket,address</a:t>
+            </a:r>
+            <a:r>
+              <a:rPr lang="en-US" sz="2000" b="0" i="0" dirty="0">
+                <a:ln>
+                  <a:solidFill>
+                    <a:srgbClr val="000000"/>
+                  </a:solidFill>
+                </a:ln>
+              </a:rPr>
+              <a:t>=8000,server=</a:t>
+            </a:r>
+            <a:r>
+              <a:rPr lang="en-US" sz="2000" b="0" i="0" dirty="0" err="1">
+                <a:ln>
+                  <a:solidFill>
+                    <a:srgbClr val="000000"/>
+                  </a:solidFill>
+                </a:ln>
+              </a:rPr>
+              <a:t>y,suspend</a:t>
+            </a:r>
+            <a:r>
+              <a:rPr lang="en-US" sz="2000" b="0" i="0" dirty="0">
+                <a:ln>
+                  <a:solidFill>
+                    <a:srgbClr val="000000"/>
+                  </a:solidFill>
+                </a:ln>
+              </a:rPr>
+              <a:t>=n -</a:t>
+            </a:r>
+            <a:r>
+              <a:rPr lang="en-US" sz="2000" b="0" i="0" dirty="0" err="1">
+                <a:ln>
+                  <a:solidFill>
+                    <a:srgbClr val="000000"/>
+                  </a:solidFill>
+                </a:ln>
+              </a:rPr>
+              <a:t>Dcom.sun.management.jmxremote</a:t>
+            </a:r>
+            <a:r>
+              <a:rPr lang="en-US" sz="2000" b="0" i="0" dirty="0">
+                <a:ln>
+                  <a:solidFill>
+                    <a:srgbClr val="000000"/>
+                  </a:solidFill>
+                </a:ln>
+              </a:rPr>
+              <a:t> -</a:t>
+            </a:r>
+            <a:r>
+              <a:rPr lang="en-US" sz="2000" b="0" i="0" dirty="0" err="1">
+                <a:ln>
+                  <a:solidFill>
+                    <a:srgbClr val="000000"/>
+                  </a:solidFill>
+                </a:ln>
+              </a:rPr>
+              <a:t>Dorg.exoplatform.container.configuration.debug</a:t>
+            </a:r>
+            <a:r>
+              <a:rPr lang="en-US" sz="2000" b="0" i="0" dirty="0">
+                <a:ln>
+                  <a:solidFill>
+                    <a:srgbClr val="000000"/>
+                  </a:solidFill>
+                </a:ln>
+              </a:rPr>
+              <a:t>" </a:t>
+            </a:r>
+            <a:endParaRPr lang="en-US" sz="2000" b="0" i="0" dirty="0" smtClean="0">
+              <a:ln>
+                <a:solidFill>
+                  <a:srgbClr val="000000"/>
+                </a:solidFill>
+              </a:ln>
+            </a:endParaRPr>
+          </a:p>
+          <a:p>
+            <a:pPr marL="362426" indent="0">
+              <a:lnSpc>
+                <a:spcPct val="90000"/>
+              </a:lnSpc>
+              <a:buNone/>
+            </a:pPr>
+            <a:r>
+              <a:rPr lang="en-US" sz="2000" b="0" i="0" dirty="0" smtClean="0">
+                <a:ln>
+                  <a:solidFill>
+                    <a:srgbClr val="000000"/>
+                  </a:solidFill>
+                </a:ln>
+              </a:rPr>
+              <a:t>set </a:t>
+            </a:r>
+            <a:r>
+              <a:rPr lang="en-US" sz="2000" b="0" i="0" dirty="0">
+                <a:ln>
+                  <a:solidFill>
+                    <a:srgbClr val="000000"/>
+                  </a:solidFill>
+                </a:ln>
+              </a:rPr>
+              <a:t>"EXO_XML=-</a:t>
+            </a:r>
+            <a:r>
+              <a:rPr lang="en-US" sz="2000" b="0" i="0" dirty="0" err="1">
+                <a:ln>
+                  <a:solidFill>
+                    <a:srgbClr val="000000"/>
+                  </a:solidFill>
+                </a:ln>
+              </a:rPr>
+              <a:t>Djavax.xml.stream.XMLOutputFactory</a:t>
+            </a:r>
+            <a:r>
+              <a:rPr lang="en-US" sz="2000" b="0" i="0" dirty="0">
+                <a:ln>
+                  <a:solidFill>
+                    <a:srgbClr val="000000"/>
+                  </a:solidFill>
+                </a:ln>
+              </a:rPr>
+              <a:t>=</a:t>
+            </a:r>
+            <a:r>
+              <a:rPr lang="en-US" sz="2000" b="0" i="0" dirty="0" err="1">
+                <a:ln>
+                  <a:solidFill>
+                    <a:srgbClr val="000000"/>
+                  </a:solidFill>
+                </a:ln>
+              </a:rPr>
+              <a:t>com.sun.xml.stream.ZephyrWriterFactory</a:t>
+            </a:r>
+            <a:r>
+              <a:rPr lang="en-US" sz="2000" b="0" i="0" dirty="0">
+                <a:ln>
+                  <a:solidFill>
+                    <a:srgbClr val="000000"/>
+                  </a:solidFill>
+                </a:ln>
+              </a:rPr>
+              <a:t> -</a:t>
+            </a:r>
+            <a:r>
+              <a:rPr lang="en-US" sz="2000" b="0" i="0" dirty="0" err="1">
+                <a:ln>
+                  <a:solidFill>
+                    <a:srgbClr val="000000"/>
+                  </a:solidFill>
+                </a:ln>
+              </a:rPr>
+              <a:t>Djavax.xml.stream.XMLInputFactory</a:t>
+            </a:r>
+            <a:r>
+              <a:rPr lang="en-US" sz="2000" b="0" i="0" dirty="0">
+                <a:ln>
+                  <a:solidFill>
+                    <a:srgbClr val="000000"/>
+                  </a:solidFill>
+                </a:ln>
+              </a:rPr>
+              <a:t>=</a:t>
+            </a:r>
+            <a:r>
+              <a:rPr lang="en-US" sz="2000" b="0" i="0" dirty="0" err="1">
+                <a:ln>
+                  <a:solidFill>
+                    <a:srgbClr val="000000"/>
+                  </a:solidFill>
+                </a:ln>
+              </a:rPr>
+              <a:t>com.sun.xml.stream.ZephyrParserFactory</a:t>
+            </a:r>
+            <a:r>
+              <a:rPr lang="en-US" sz="2000" b="0" i="0" dirty="0">
+                <a:ln>
+                  <a:solidFill>
+                    <a:srgbClr val="000000"/>
+                  </a:solidFill>
+                </a:ln>
+              </a:rPr>
+              <a:t> -</a:t>
+            </a:r>
+            <a:r>
+              <a:rPr lang="en-US" sz="2000" b="0" i="0" dirty="0" err="1">
+                <a:ln>
+                  <a:solidFill>
+                    <a:srgbClr val="000000"/>
+                  </a:solidFill>
+                </a:ln>
+              </a:rPr>
+              <a:t>Djavax.xml.stream.XMLEventFactory</a:t>
+            </a:r>
+            <a:r>
+              <a:rPr lang="en-US" sz="2000" b="0" i="0" dirty="0">
+                <a:ln>
+                  <a:solidFill>
+                    <a:srgbClr val="000000"/>
+                  </a:solidFill>
+                </a:ln>
+              </a:rPr>
+              <a:t>=</a:t>
+            </a:r>
+            <a:r>
+              <a:rPr lang="en-US" sz="2000" b="0" i="0" dirty="0" err="1">
+                <a:ln>
+                  <a:solidFill>
+                    <a:srgbClr val="000000"/>
+                  </a:solidFill>
+                </a:ln>
+              </a:rPr>
+              <a:t>com.sun.xml.stream.events.ZephyrEventFactory</a:t>
+            </a:r>
+            <a:r>
+              <a:rPr lang="en-US" sz="2000" b="0" i="0" dirty="0">
+                <a:ln>
+                  <a:solidFill>
+                    <a:srgbClr val="000000"/>
+                  </a:solidFill>
+                </a:ln>
+              </a:rPr>
+              <a:t>" </a:t>
+            </a:r>
+            <a:endParaRPr lang="en-US" sz="2000" b="0" i="0" dirty="0" smtClean="0">
+              <a:ln>
+                <a:solidFill>
+                  <a:srgbClr val="000000"/>
+                </a:solidFill>
+              </a:ln>
+            </a:endParaRPr>
+          </a:p>
+          <a:p>
+            <a:pPr marL="362426" indent="0">
+              <a:lnSpc>
+                <a:spcPct val="90000"/>
+              </a:lnSpc>
+              <a:buNone/>
+            </a:pPr>
+            <a:r>
+              <a:rPr lang="en-US" sz="2000" b="0" i="0" dirty="0" smtClean="0">
+                <a:ln>
+                  <a:solidFill>
+                    <a:srgbClr val="000000"/>
+                  </a:solidFill>
+                </a:ln>
+              </a:rPr>
+              <a:t>set </a:t>
+            </a:r>
+            <a:r>
+              <a:rPr lang="en-US" sz="2000" b="0" i="0" dirty="0">
+                <a:ln>
+                  <a:solidFill>
+                    <a:srgbClr val="000000"/>
+                  </a:solidFill>
+                </a:ln>
+              </a:rPr>
+              <a:t>"JAVA_OPTS=%JAVA_OPTS% %EXO_OPTS% %EXO_PROFILES% %EXO_XML%" </a:t>
+            </a:r>
+            <a:endParaRPr lang="en-US" sz="2000" b="0" i="0" dirty="0" smtClean="0">
+              <a:ln>
+                <a:solidFill>
+                  <a:srgbClr val="000000"/>
+                </a:solidFill>
+              </a:ln>
+            </a:endParaRPr>
           </a:p>
         </p:txBody>
       </p:sp>
     </p:spTree>
     <p:extLst>
       <p:ext uri="{BB962C8B-B14F-4D97-AF65-F5344CB8AC3E}">
-        <p14:creationId xmlns:p14="http://schemas.microsoft.com/office/powerpoint/2010/main" val="1246383142"/>
+        <p14:creationId xmlns:p14="http://schemas.microsoft.com/office/powerpoint/2010/main" val="2902699330"/>
       </p:ext>
     </p:extLst>
   </p:cSld>
@@ -22648,7 +22443,7 @@
       </p:grpSpPr>
       <p:sp>
         <p:nvSpPr>
-          <p:cNvPr id="16386" name="Rectangle 1"/>
+          <p:cNvPr id="15362" name="Rectangle 1"/>
           <p:cNvSpPr>
             <a:spLocks noGrp="1" noChangeArrowheads="1"/>
           </p:cNvSpPr>
@@ -22658,8 +22453,8 @@
         </p:nvSpPr>
         <p:spPr>
           <a:xfrm>
-            <a:off x="490435" y="255927"/>
-            <a:ext cx="10179255" cy="423263"/>
+            <a:off x="490435" y="255926"/>
+            <a:ext cx="10179255" cy="454024"/>
           </a:xfrm>
         </p:spPr>
         <p:txBody>
@@ -22669,30 +22464,14 @@
             <a:pPr eaLnBrk="1" hangingPunct="1"/>
             <a:r>
               <a:rPr lang="en-US" dirty="0" smtClean="0"/>
-              <a:t>Start and Stop </a:t>
-            </a:r>
-            <a:r>
-              <a:rPr lang="en-US" dirty="0" err="1" smtClean="0"/>
-              <a:t>eXo</a:t>
-            </a:r>
-            <a:r>
-              <a:rPr lang="en-US" dirty="0" smtClean="0"/>
-              <a:t> on </a:t>
-            </a:r>
-            <a:r>
-              <a:rPr lang="en-US" dirty="0" err="1" smtClean="0"/>
-              <a:t>JBoss</a:t>
-            </a:r>
-            <a:r>
-              <a:rPr lang="en-US" dirty="0" smtClean="0"/>
-              <a:t> EAP</a:t>
-            </a:r>
-          </a:p>
-        </p:txBody>
-      </p:sp>
-      <p:sp>
-        <p:nvSpPr>
-          <p:cNvPr id="16387" name="Rectangle 2"/>
+              <a:t>Installing eXo on JBoss EAP – Logging </a:t>
+            </a:r>
+          </a:p>
+        </p:txBody>
+      </p:sp>
+      <p:sp>
+        <p:nvSpPr>
+          <p:cNvPr id="15363" name="Rectangle 2"/>
           <p:cNvSpPr>
             <a:spLocks noGrp="1" noChangeArrowheads="1"/>
           </p:cNvSpPr>
@@ -22702,7 +22481,7 @@
         </p:nvSpPr>
         <p:spPr>
           <a:xfrm>
-            <a:off x="507964" y="1279507"/>
+            <a:off x="507964" y="1350945"/>
             <a:ext cx="10179255" cy="5089000"/>
           </a:xfrm>
         </p:spPr>
@@ -22714,170 +22493,196 @@
               <a:buNone/>
             </a:pPr>
             <a:r>
+              <a:rPr lang="fr-FR" dirty="0" err="1"/>
+              <a:t>Add</a:t>
+            </a:r>
+            <a:r>
+              <a:rPr lang="fr-FR" dirty="0"/>
+              <a:t> </a:t>
+            </a:r>
+            <a:r>
+              <a:rPr lang="fr-FR" dirty="0" smtClean="0"/>
+              <a:t>to </a:t>
+            </a:r>
+            <a:r>
+              <a:rPr lang="fr-FR" dirty="0" err="1" smtClean="0"/>
+              <a:t>jboss</a:t>
+            </a:r>
+            <a:r>
+              <a:rPr lang="fr-FR" dirty="0" err="1"/>
+              <a:t>-root</a:t>
+            </a:r>
+            <a:r>
+              <a:rPr lang="fr-FR" dirty="0"/>
+              <a:t>/server/default/</a:t>
+            </a:r>
+            <a:r>
+              <a:rPr lang="fr-FR" dirty="0" err="1"/>
+              <a:t>conf</a:t>
+            </a:r>
+            <a:r>
+              <a:rPr lang="fr-FR" dirty="0"/>
+              <a:t>/jboss-</a:t>
+            </a:r>
+            <a:r>
+              <a:rPr lang="fr-FR" dirty="0" smtClean="0"/>
+              <a:t>log4j.xml</a:t>
+            </a:r>
+            <a:r>
               <a:rPr lang="en-US" dirty="0" smtClean="0"/>
-              <a:t>$</a:t>
-            </a:r>
-            <a:r>
-              <a:rPr lang="en-US" dirty="0" smtClean="0"/>
-              <a:t>JBOSS_HOME is </a:t>
-            </a:r>
-            <a:r>
-              <a:rPr lang="en-US" dirty="0" smtClean="0"/>
-              <a:t>the installation </a:t>
-            </a:r>
-            <a:r>
-              <a:rPr lang="en-US" dirty="0"/>
-              <a:t>directory</a:t>
-            </a:r>
-            <a:endParaRPr lang="en-US" dirty="0" smtClean="0"/>
-          </a:p>
-          <a:p>
-            <a:pPr marL="219361" indent="-216749">
+              <a:t>:</a:t>
+            </a:r>
+            <a:endParaRPr lang="en-US" dirty="0"/>
+          </a:p>
+          <a:p>
+            <a:pPr marL="584962" lvl="1" indent="-219361"/>
+            <a:r>
+              <a:rPr lang="en-US" i="0" dirty="0"/>
+              <a:t>&lt;!-- Limit the JSR170 categories --&gt; </a:t>
+            </a:r>
+            <a:r>
+              <a:rPr lang="en-US" i="0" dirty="0" smtClean="0"/>
+              <a:t/>
+            </a:r>
+            <a:br>
+              <a:rPr lang="en-US" i="0" dirty="0" smtClean="0"/>
+            </a:br>
+            <a:r>
+              <a:rPr lang="en-US" i="0" dirty="0" smtClean="0"/>
+              <a:t>&lt;</a:t>
+            </a:r>
+            <a:r>
+              <a:rPr lang="en-US" i="0" dirty="0"/>
+              <a:t>category name="</a:t>
+            </a:r>
+            <a:r>
+              <a:rPr lang="en-US" i="0" dirty="0" err="1"/>
+              <a:t>exo.jcr</a:t>
+            </a:r>
+            <a:r>
+              <a:rPr lang="en-US" i="0" dirty="0"/>
+              <a:t>"&gt; </a:t>
+            </a:r>
+            <a:r>
+              <a:rPr lang="en-US" i="0" dirty="0" smtClean="0"/>
+              <a:t/>
+            </a:r>
+            <a:br>
+              <a:rPr lang="en-US" i="0" dirty="0" smtClean="0"/>
+            </a:br>
+            <a:r>
+              <a:rPr lang="en-US" i="0" dirty="0" smtClean="0"/>
+              <a:t>	&lt;</a:t>
+            </a:r>
+            <a:r>
+              <a:rPr lang="en-US" i="0" dirty="0"/>
+              <a:t>priority value="INFO"/&gt; </a:t>
+            </a:r>
+            <a:r>
+              <a:rPr lang="en-US" i="0" dirty="0" smtClean="0"/>
+              <a:t/>
+            </a:r>
+            <a:br>
+              <a:rPr lang="en-US" i="0" dirty="0" smtClean="0"/>
+            </a:br>
+            <a:r>
+              <a:rPr lang="en-US" i="0" dirty="0" smtClean="0"/>
+              <a:t>&lt;</a:t>
+            </a:r>
+            <a:r>
+              <a:rPr lang="en-US" i="0" dirty="0"/>
+              <a:t>/category&gt; </a:t>
+            </a:r>
+            <a:endParaRPr lang="en-US" i="0" dirty="0" smtClean="0"/>
+          </a:p>
+          <a:p>
+            <a:pPr marL="584962" lvl="1" indent="-219361"/>
+            <a:r>
+              <a:rPr lang="en-US" i="0" dirty="0" smtClean="0"/>
+              <a:t/>
+            </a:r>
+            <a:br>
+              <a:rPr lang="en-US" i="0" dirty="0" smtClean="0"/>
+            </a:br>
+            <a:r>
+              <a:rPr lang="en-US" i="0" dirty="0" smtClean="0"/>
+              <a:t>&lt;</a:t>
+            </a:r>
+            <a:r>
+              <a:rPr lang="en-US" i="0" dirty="0"/>
+              <a:t>!-- Limit the JSR-168 and JSR-286 categories --</a:t>
+            </a:r>
+            <a:r>
+              <a:rPr lang="en-US" i="0" dirty="0" smtClean="0"/>
+              <a:t>&gt;</a:t>
+            </a:r>
+            <a:br>
+              <a:rPr lang="en-US" i="0" dirty="0" smtClean="0"/>
+            </a:br>
+            <a:r>
+              <a:rPr lang="en-US" i="0" dirty="0" smtClean="0"/>
+              <a:t> </a:t>
+            </a:r>
+            <a:r>
+              <a:rPr lang="en-US" i="0" dirty="0"/>
+              <a:t>&lt;category name="</a:t>
+            </a:r>
+            <a:r>
+              <a:rPr lang="en-US" i="0" dirty="0" err="1"/>
+              <a:t>org.exoplatform.services</a:t>
+            </a:r>
+            <a:r>
+              <a:rPr lang="en-US" i="0" dirty="0"/>
+              <a:t>"&gt; </a:t>
+            </a:r>
+            <a:r>
+              <a:rPr lang="en-US" i="0" dirty="0" smtClean="0"/>
+              <a:t/>
+            </a:r>
+            <a:br>
+              <a:rPr lang="en-US" i="0" dirty="0" smtClean="0"/>
+            </a:br>
+            <a:r>
+              <a:rPr lang="en-US" i="0" dirty="0" smtClean="0"/>
+              <a:t>	&lt;</a:t>
+            </a:r>
+            <a:r>
+              <a:rPr lang="en-US" i="0" dirty="0"/>
+              <a:t>priority value="INFO"/&gt; </a:t>
+            </a:r>
+            <a:r>
+              <a:rPr lang="en-US" i="0" dirty="0" smtClean="0"/>
+              <a:t/>
+            </a:r>
+            <a:br>
+              <a:rPr lang="en-US" i="0" dirty="0" smtClean="0"/>
+            </a:br>
+            <a:r>
+              <a:rPr lang="en-US" i="0" dirty="0" smtClean="0"/>
+              <a:t>&lt;</a:t>
+            </a:r>
+            <a:r>
+              <a:rPr lang="en-US" i="0" dirty="0"/>
+              <a:t>/category</a:t>
+            </a:r>
+            <a:r>
+              <a:rPr lang="en-US" i="0" dirty="0" smtClean="0"/>
+              <a:t>&gt;</a:t>
+            </a:r>
+            <a:endParaRPr lang="en-US" i="0" dirty="0"/>
+          </a:p>
+          <a:p>
+            <a:pPr marL="365601" lvl="1" indent="0">
               <a:buNone/>
             </a:pPr>
-            <a:endParaRPr lang="en-US" dirty="0" smtClean="0"/>
-          </a:p>
-          <a:p>
-            <a:pPr marL="219361" indent="-216749">
-              <a:buNone/>
-            </a:pPr>
-            <a:r>
-              <a:rPr lang="en-US" dirty="0" smtClean="0"/>
-              <a:t>Start</a:t>
-            </a:r>
             <a:endParaRPr lang="en-US" dirty="0"/>
-          </a:p>
-          <a:p>
-            <a:pPr marL="584962" lvl="1" indent="-219361"/>
-            <a:r>
-              <a:rPr lang="en-US" dirty="0"/>
-              <a:t>Linux and OS X: $JBOSS_HOME/bin/</a:t>
-            </a:r>
-            <a:r>
-              <a:rPr lang="en-US" dirty="0" err="1"/>
-              <a:t>run.sh</a:t>
-            </a:r>
-            <a:endParaRPr lang="en-US" dirty="0"/>
-          </a:p>
-          <a:p>
-            <a:pPr marL="584962" lvl="1" indent="-219361"/>
-            <a:r>
-              <a:rPr lang="en-US" dirty="0"/>
-              <a:t>Windows</a:t>
-            </a:r>
-            <a:r>
-              <a:rPr lang="en-US" dirty="0" smtClean="0"/>
-              <a:t>: %</a:t>
-            </a:r>
-            <a:r>
-              <a:rPr lang="en-US" dirty="0"/>
-              <a:t>JBOSS_HOME</a:t>
-            </a:r>
-            <a:r>
-              <a:rPr lang="en-US" dirty="0" smtClean="0"/>
-              <a:t>%\bin\</a:t>
-            </a:r>
-            <a:r>
-              <a:rPr lang="en-US" dirty="0" err="1" smtClean="0"/>
-              <a:t>run.bat</a:t>
-            </a:r>
-            <a:endParaRPr lang="en-US" dirty="0" smtClean="0"/>
-          </a:p>
-          <a:p>
-            <a:pPr marL="584962" lvl="1" indent="-219361"/>
-            <a:r>
-              <a:rPr lang="en-US" dirty="0"/>
-              <a:t>Start Message: “Started in 3m</a:t>
-            </a:r>
-            <a:r>
-              <a:rPr lang="en-US" dirty="0" smtClean="0"/>
-              <a:t>:14s:513ms”</a:t>
-            </a:r>
-          </a:p>
-          <a:p>
-            <a:pPr marL="219361" indent="-216749">
-              <a:buNone/>
-            </a:pPr>
-            <a:r>
-              <a:rPr lang="en-US" dirty="0" smtClean="0"/>
-              <a:t>Stop</a:t>
-            </a:r>
-          </a:p>
-          <a:p>
-            <a:pPr marL="584962" lvl="1" indent="-219361"/>
-            <a:r>
-              <a:rPr lang="en-US" dirty="0" smtClean="0"/>
-              <a:t>Linux </a:t>
-            </a:r>
-            <a:r>
-              <a:rPr lang="en-US" dirty="0"/>
-              <a:t>or OS X: $JBOSS_HOME/bin/</a:t>
-            </a:r>
-            <a:r>
-              <a:rPr lang="en-US" dirty="0" err="1" smtClean="0"/>
-              <a:t>shutdown.sh</a:t>
-            </a:r>
-            <a:endParaRPr lang="en-US" dirty="0" smtClean="0"/>
-          </a:p>
-          <a:p>
-            <a:pPr marL="584962" lvl="1" indent="-219361"/>
-            <a:r>
-              <a:rPr lang="en-US" dirty="0" smtClean="0"/>
-              <a:t>Windows</a:t>
-            </a:r>
-            <a:r>
-              <a:rPr lang="en-US" dirty="0"/>
-              <a:t>: %JBOSS_HOME</a:t>
-            </a:r>
-            <a:r>
-              <a:rPr lang="en-US" dirty="0" smtClean="0"/>
-              <a:t>%\bin\</a:t>
-            </a:r>
-            <a:r>
-              <a:rPr lang="en-US" dirty="0" err="1" smtClean="0"/>
-              <a:t>shutdown.bat</a:t>
-            </a:r>
-            <a:r>
-              <a:rPr lang="en-US" dirty="0" smtClean="0"/>
-              <a:t> </a:t>
-            </a:r>
-          </a:p>
-          <a:p>
-            <a:pPr marL="584962" lvl="1" indent="-219361"/>
-            <a:r>
-              <a:rPr lang="en-US" dirty="0" smtClean="0"/>
-              <a:t>Stop </a:t>
-            </a:r>
-            <a:r>
-              <a:rPr lang="en-US" dirty="0"/>
-              <a:t>message: “(</a:t>
-            </a:r>
-            <a:r>
-              <a:rPr lang="en-US" dirty="0" err="1"/>
-              <a:t>JBoss</a:t>
-            </a:r>
-            <a:r>
-              <a:rPr lang="en-US" dirty="0"/>
-              <a:t> Shutdown Hook) Shutdown </a:t>
-            </a:r>
-            <a:r>
-              <a:rPr lang="en-US" dirty="0" smtClean="0"/>
-              <a:t>complete”</a:t>
-            </a:r>
-            <a:endParaRPr lang="en-US" dirty="0"/>
-          </a:p>
-          <a:p>
-            <a:pPr marL="219361" indent="-216749">
-              <a:buNone/>
-            </a:pPr>
-            <a:endParaRPr lang="en-US" dirty="0" smtClean="0"/>
           </a:p>
         </p:txBody>
       </p:sp>
     </p:spTree>
     <p:extLst>
       <p:ext uri="{BB962C8B-B14F-4D97-AF65-F5344CB8AC3E}">
-        <p14:creationId xmlns:p14="http://schemas.microsoft.com/office/powerpoint/2010/main" val="1652852145"/>
+        <p14:creationId xmlns:p14="http://schemas.microsoft.com/office/powerpoint/2010/main" val="1246383142"/>
       </p:ext>
     </p:extLst>
   </p:cSld>
@@ -22934,12 +22739,8 @@
           <a:p>
             <a:pPr eaLnBrk="1" hangingPunct="1"/>
             <a:r>
-              <a:rPr lang="en-US" dirty="0" err="1" smtClean="0"/>
-              <a:t>JBoss</a:t>
-            </a:r>
-            <a:r>
               <a:rPr lang="en-US" dirty="0" smtClean="0"/>
-              <a:t> in Debug Mode</a:t>
+              <a:t>Start and Stop eXo on JBoss EAP</a:t>
             </a:r>
           </a:p>
         </p:txBody>
@@ -22967,23 +22768,249 @@
             <a:pPr marL="219361" indent="-216749">
               <a:buNone/>
             </a:pPr>
+            <a:r>
+              <a:rPr lang="en-US" dirty="0" smtClean="0"/>
+              <a:t>$JBOSS_HOME is the installation </a:t>
+            </a:r>
+            <a:r>
+              <a:rPr lang="en-US" dirty="0"/>
+              <a:t>directory</a:t>
+            </a:r>
             <a:endParaRPr lang="en-US" dirty="0" smtClean="0"/>
           </a:p>
           <a:p>
             <a:pPr marL="219361" indent="-216749">
               <a:buNone/>
             </a:pPr>
+            <a:endParaRPr lang="en-US" dirty="0" smtClean="0"/>
+          </a:p>
+          <a:p>
+            <a:pPr marL="219361" indent="-216749">
+              <a:buNone/>
+            </a:pPr>
             <a:r>
               <a:rPr lang="en-US" dirty="0" smtClean="0"/>
-              <a:t>Activate JMX Monitoring, remote debugging and </a:t>
+              <a:t>Start</a:t>
+            </a:r>
+            <a:endParaRPr lang="en-US" dirty="0"/>
+          </a:p>
+          <a:p>
+            <a:pPr marL="584962" lvl="1" indent="-219361"/>
+            <a:r>
+              <a:rPr lang="en-US" dirty="0"/>
+              <a:t>Linux and OS X: $JBOSS_HOME/bin/</a:t>
+            </a:r>
+            <a:r>
+              <a:rPr lang="en-US" dirty="0" err="1"/>
+              <a:t>run.sh</a:t>
+            </a:r>
+            <a:endParaRPr lang="en-US" dirty="0"/>
+          </a:p>
+          <a:p>
+            <a:pPr marL="584962" lvl="1" indent="-219361"/>
+            <a:r>
+              <a:rPr lang="en-US" dirty="0"/>
+              <a:t>Windows</a:t>
+            </a:r>
+            <a:r>
+              <a:rPr lang="en-US" dirty="0" smtClean="0"/>
+              <a:t>: %</a:t>
+            </a:r>
+            <a:r>
+              <a:rPr lang="en-US" dirty="0"/>
+              <a:t>JBOSS_HOME</a:t>
+            </a:r>
+            <a:r>
+              <a:rPr lang="en-US" dirty="0" smtClean="0"/>
+              <a:t>%\bin\</a:t>
             </a:r>
             <a:r>
               <a:rPr lang="en-US" dirty="0" err="1" smtClean="0"/>
-              <a:t>eXo</a:t>
+              <a:t>run.bat</a:t>
+            </a:r>
+            <a:endParaRPr lang="en-US" dirty="0" smtClean="0"/>
+          </a:p>
+          <a:p>
+            <a:pPr marL="584962" lvl="1" indent="-219361"/>
+            <a:r>
+              <a:rPr lang="en-US" dirty="0"/>
+              <a:t>Start Message: “Started in 3m</a:t>
             </a:r>
             <a:r>
               <a:rPr lang="en-US" dirty="0" smtClean="0"/>
-              <a:t>  mode</a:t>
+              <a:t>:14s:513ms”</a:t>
+            </a:r>
+          </a:p>
+          <a:p>
+            <a:pPr marL="219361" indent="-216749">
+              <a:buNone/>
+            </a:pPr>
+            <a:r>
+              <a:rPr lang="en-US" dirty="0" smtClean="0"/>
+              <a:t>Stop</a:t>
+            </a:r>
+          </a:p>
+          <a:p>
+            <a:pPr marL="584962" lvl="1" indent="-219361"/>
+            <a:r>
+              <a:rPr lang="en-US" dirty="0" smtClean="0"/>
+              <a:t>Linux </a:t>
+            </a:r>
+            <a:r>
+              <a:rPr lang="en-US" dirty="0"/>
+              <a:t>or OS X: $JBOSS_HOME/bin/</a:t>
+            </a:r>
+            <a:r>
+              <a:rPr lang="en-US" dirty="0" err="1" smtClean="0"/>
+              <a:t>shutdown.sh</a:t>
+            </a:r>
+            <a:endParaRPr lang="en-US" dirty="0" smtClean="0"/>
+          </a:p>
+          <a:p>
+            <a:pPr marL="584962" lvl="1" indent="-219361"/>
+            <a:r>
+              <a:rPr lang="en-US" dirty="0" smtClean="0"/>
+              <a:t>Windows</a:t>
+            </a:r>
+            <a:r>
+              <a:rPr lang="en-US" dirty="0"/>
+              <a:t>: %JBOSS_HOME</a:t>
+            </a:r>
+            <a:r>
+              <a:rPr lang="en-US" dirty="0" smtClean="0"/>
+              <a:t>%\bin\</a:t>
+            </a:r>
+            <a:r>
+              <a:rPr lang="en-US" dirty="0" err="1" smtClean="0"/>
+              <a:t>shutdown.bat</a:t>
+            </a:r>
+            <a:r>
+              <a:rPr lang="en-US" dirty="0" smtClean="0"/>
+              <a:t> </a:t>
+            </a:r>
+          </a:p>
+          <a:p>
+            <a:pPr marL="584962" lvl="1" indent="-219361"/>
+            <a:r>
+              <a:rPr lang="en-US" dirty="0" smtClean="0"/>
+              <a:t>Stop </a:t>
+            </a:r>
+            <a:r>
+              <a:rPr lang="en-US" dirty="0"/>
+              <a:t>message: “(JBoss Shutdown Hook) Shutdown </a:t>
+            </a:r>
+            <a:r>
+              <a:rPr lang="en-US" dirty="0" smtClean="0"/>
+              <a:t>complete”</a:t>
+            </a:r>
+            <a:endParaRPr lang="en-US" dirty="0"/>
+          </a:p>
+          <a:p>
+            <a:pPr marL="219361" indent="-216749">
+              <a:buNone/>
+            </a:pPr>
+            <a:endParaRPr lang="en-US" dirty="0" smtClean="0"/>
+          </a:p>
+        </p:txBody>
+      </p:sp>
+    </p:spTree>
+    <p:extLst>
+      <p:ext uri="{BB962C8B-B14F-4D97-AF65-F5344CB8AC3E}">
+        <p14:creationId xmlns:p14="http://schemas.microsoft.com/office/powerpoint/2010/main" val="1652852145"/>
+      </p:ext>
+    </p:extLst>
+  </p:cSld>
+  <p:clrMapOvr>
+    <a:masterClrMapping/>
+  </p:clrMapOvr>
+  <p:transition xmlns:p14="http://schemas.microsoft.com/office/powerpoint/2010/main"/>
+  <p:timing>
+    <p:tnLst>
+      <p:par>
+        <p:cTn xmlns:p14="http://schemas.microsoft.com/office/powerpoint/2010/main" id="1" dur="indefinite" restart="never" nodeType="tmRoot"/>
+      </p:par>
+    </p:tnLst>
+  </p:timing>
+</p:sld>
+</file>
+
+<file path=ppt/slides/slide23.xml><?xml version="1.0" encoding="utf-8"?>
+<p:sld xmlns:a="http://schemas.openxmlformats.org/drawingml/2006/main" xmlns:r="http://schemas.openxmlformats.org/officeDocument/2006/relationships" xmlns:p="http://schemas.openxmlformats.org/presentationml/2006/main">
+  <p:cSld>
+    <p:spTree>
+      <p:nvGrpSpPr>
+        <p:cNvPr id="1" name=""/>
+        <p:cNvGrpSpPr/>
+        <p:nvPr/>
+      </p:nvGrpSpPr>
+      <p:grpSpPr>
+        <a:xfrm>
+          <a:off x="0" y="0"/>
+          <a:ext cx="0" cy="0"/>
+          <a:chOff x="0" y="0"/>
+          <a:chExt cx="0" cy="0"/>
+        </a:xfrm>
+      </p:grpSpPr>
+      <p:sp>
+        <p:nvSpPr>
+          <p:cNvPr id="16386" name="Rectangle 1"/>
+          <p:cNvSpPr>
+            <a:spLocks noGrp="1" noChangeArrowheads="1"/>
+          </p:cNvSpPr>
+          <p:nvPr>
+            <p:ph type="title"/>
+          </p:nvPr>
+        </p:nvSpPr>
+        <p:spPr>
+          <a:xfrm>
+            <a:off x="490435" y="255927"/>
+            <a:ext cx="10179255" cy="423263"/>
+          </a:xfrm>
+        </p:spPr>
+        <p:txBody>
+          <a:bodyPr rIns="41783" anchor="b"/>
+          <a:lstStyle/>
+          <a:p>
+            <a:pPr eaLnBrk="1" hangingPunct="1"/>
+            <a:r>
+              <a:rPr lang="en-US" dirty="0" smtClean="0"/>
+              <a:t>JBoss in Debug Mode</a:t>
+            </a:r>
+          </a:p>
+        </p:txBody>
+      </p:sp>
+      <p:sp>
+        <p:nvSpPr>
+          <p:cNvPr id="16387" name="Rectangle 2"/>
+          <p:cNvSpPr>
+            <a:spLocks noGrp="1" noChangeArrowheads="1"/>
+          </p:cNvSpPr>
+          <p:nvPr>
+            <p:ph type="body" idx="1"/>
+          </p:nvPr>
+        </p:nvSpPr>
+        <p:spPr>
+          <a:xfrm>
+            <a:off x="507964" y="1279507"/>
+            <a:ext cx="10179255" cy="5089000"/>
+          </a:xfrm>
+        </p:spPr>
+        <p:txBody>
+          <a:bodyPr rIns="41783"/>
+          <a:lstStyle/>
+          <a:p>
+            <a:pPr marL="219361" indent="-216749">
+              <a:buNone/>
+            </a:pPr>
+            <a:endParaRPr lang="en-US" dirty="0" smtClean="0"/>
+          </a:p>
+          <a:p>
+            <a:pPr marL="219361" indent="-216749">
+              <a:buNone/>
+            </a:pPr>
+            <a:r>
+              <a:rPr lang="en-US" dirty="0" smtClean="0"/>
+              <a:t>Activate JMX Monitoring, remote debugging and eXo  mode</a:t>
             </a:r>
             <a:endParaRPr lang="en-US" dirty="0"/>
           </a:p>
@@ -23021,11 +23048,7 @@
             </a:r>
             <a:r>
               <a:rPr lang="en-US" dirty="0" smtClean="0"/>
-              <a:t>dd </a:t>
-            </a:r>
-            <a:r>
-              <a:rPr lang="en-US" dirty="0" smtClean="0"/>
-              <a:t>the prepared parameter $</a:t>
+              <a:t>dd the prepared parameter $</a:t>
             </a:r>
             <a:r>
               <a:rPr lang="en-US" dirty="0"/>
@@ -23067,7 +23090,7 @@
 </p:sld>
 </file>
 
-<file path=ppt/slides/slide23.xml><?xml version="1.0" encoding="utf-8"?>
+<file path=ppt/slides/slide24.xml><?xml version="1.0" encoding="utf-8"?>
 <p:sld xmlns:a="http://schemas.openxmlformats.org/drawingml/2006/main" xmlns:r="http://schemas.openxmlformats.org/officeDocument/2006/relationships" xmlns:p="http://schemas.openxmlformats.org/presentationml/2006/main">
   <p:cSld>
     <p:spTree>
@@ -23181,7 +23204,7 @@
                   <a:tab pos="9144000" algn="l"/>
                 </a:tabLst>
               </a:pPr>
-              <a:t>23</a:t>
+              <a:t>24</a:t>
             </a:fld>
             <a:endParaRPr lang="en-GB" sz="1400">
               <a:solidFill>
@@ -23321,7 +23344,7 @@
 </p:sld>
 </file>
 
-<file path=ppt/slides/slide24.xml><?xml version="1.0" encoding="utf-8"?>
+<file path=ppt/slides/slide25.xml><?xml version="1.0" encoding="utf-8"?>
 <p:sld xmlns:a="http://schemas.openxmlformats.org/drawingml/2006/main" xmlns:r="http://schemas.openxmlformats.org/officeDocument/2006/relationships" xmlns:p="http://schemas.openxmlformats.org/presentationml/2006/main">
   <p:cSld>
     <p:spTree>
@@ -23360,12 +23383,8 @@
           <a:p>
             <a:pPr eaLnBrk="1" hangingPunct="1"/>
             <a:r>
-              <a:rPr lang="en-US" dirty="0" err="1" smtClean="0"/>
-              <a:t>eXo</a:t>
-            </a:r>
-            <a:r>
               <a:rPr lang="en-US" dirty="0" smtClean="0"/>
-              <a:t> Modules</a:t>
+              <a:t>eXo Modules</a:t>
             </a:r>
           </a:p>
         </p:txBody>
@@ -23398,15 +23417,7 @@
             </a:pPr>
             <a:r>
               <a:rPr lang="en-US" sz="2400" dirty="0" smtClean="0"/>
-              <a:t>Each module contains a number of application and can be activate individually. The module “</a:t>
-            </a:r>
-            <a:r>
-              <a:rPr lang="en-US" sz="2400" dirty="0" err="1" smtClean="0"/>
-              <a:t>eXo</a:t>
-            </a:r>
-            <a:r>
-              <a:rPr lang="en-US" sz="2400" dirty="0" smtClean="0"/>
-              <a:t> Content” is always activated.</a:t>
+              <a:t>Each module contains a number of application and can be activate individually. The module “eXo Content” is always activated.</a:t>
             </a:r>
           </a:p>
         </p:txBody>
@@ -23792,7 +23803,7 @@
 </p:sld>
 </file>
 
-<file path=ppt/slides/slide25.xml><?xml version="1.0" encoding="utf-8"?>
+<file path=ppt/slides/slide26.xml><?xml version="1.0" encoding="utf-8"?>
 <p:sld xmlns:a="http://schemas.openxmlformats.org/drawingml/2006/main" xmlns:r="http://schemas.openxmlformats.org/officeDocument/2006/relationships" xmlns:p="http://schemas.openxmlformats.org/presentationml/2006/main">
   <p:cSld>
     <p:spTree>
@@ -23831,12 +23842,8 @@
           <a:p>
             <a:pPr eaLnBrk="1" hangingPunct="1"/>
             <a:r>
-              <a:rPr lang="en-US" dirty="0" err="1" smtClean="0"/>
-              <a:t>eXo</a:t>
-            </a:r>
-            <a:r>
               <a:rPr lang="en-US" dirty="0" smtClean="0"/>
-              <a:t> Profiles</a:t>
+              <a:t>eXo Profiles</a:t>
             </a:r>
           </a:p>
         </p:txBody>
@@ -23869,15 +23876,7 @@
             </a:pPr>
             <a:r>
               <a:rPr lang="en-US" dirty="0" smtClean="0"/>
-              <a:t>Enable different modules of </a:t>
-            </a:r>
-            <a:r>
-              <a:rPr lang="en-US" dirty="0" err="1" smtClean="0"/>
-              <a:t>eXo</a:t>
-            </a:r>
-            <a:r>
-              <a:rPr lang="en-US" dirty="0" smtClean="0"/>
-              <a:t> Platform</a:t>
+              <a:t>Enable different modules of eXo Platform</a:t>
             </a:r>
           </a:p>
           <a:p>
@@ -23919,15 +23918,7 @@
             </a:br>
             <a:r>
               <a:rPr lang="en-US" dirty="0" smtClean="0"/>
-              <a:t>starts </a:t>
-            </a:r>
-            <a:r>
-              <a:rPr lang="en-US" dirty="0" err="1" smtClean="0"/>
-              <a:t>eXo</a:t>
-            </a:r>
-            <a:r>
-              <a:rPr lang="en-US" dirty="0" smtClean="0"/>
-              <a:t> </a:t>
+              <a:t>starts eXo </a:t>
             </a:r>
             <a:r>
               <a:rPr lang="en-US" dirty="0"/>
@@ -23973,7 +23964,7 @@
 </p:sld>
 </file>
 
-<file path=ppt/slides/slide26.xml><?xml version="1.0" encoding="utf-8"?>
+<file path=ppt/slides/slide27.xml><?xml version="1.0" encoding="utf-8"?>
 <p:sld xmlns:a="http://schemas.openxmlformats.org/drawingml/2006/main" xmlns:r="http://schemas.openxmlformats.org/officeDocument/2006/relationships" xmlns:p="http://schemas.openxmlformats.org/presentationml/2006/main">
   <p:cSld>
     <p:spTree>
@@ -24012,12 +24003,8 @@
           <a:p>
             <a:pPr eaLnBrk="1" hangingPunct="1"/>
             <a:r>
-              <a:rPr lang="en-US" dirty="0" err="1" smtClean="0"/>
-              <a:t>eXo</a:t>
-            </a:r>
-            <a:r>
               <a:rPr lang="en-US" dirty="0" smtClean="0"/>
-              <a:t> Composite Profiles</a:t>
+              <a:t>eXo Composite Profiles</a:t>
             </a:r>
           </a:p>
         </p:txBody>
@@ -24104,15 +24091,7 @@
             </a:pPr>
             <a:r>
               <a:rPr lang="en-US" dirty="0"/>
-              <a:t>When using </a:t>
-            </a:r>
-            <a:r>
-              <a:rPr lang="en-US" dirty="0" err="1"/>
-              <a:t>JBoss</a:t>
-            </a:r>
-            <a:r>
-              <a:rPr lang="en-US" dirty="0"/>
-              <a:t> you have to modify the </a:t>
+              <a:t>When using JBoss you have to modify the </a:t>
             </a:r>
             <a:r>
               <a:rPr lang="en-US" dirty="0" err="1"/>
@@ -24308,7 +24287,7 @@
 </p:sld>
 </file>
 
-<file path=ppt/slides/slide27.xml><?xml version="1.0" encoding="utf-8"?>
+<file path=ppt/slides/slide28.xml><?xml version="1.0" encoding="utf-8"?>
 <p:sld xmlns:a="http://schemas.openxmlformats.org/drawingml/2006/main" xmlns:r="http://schemas.openxmlformats.org/officeDocument/2006/relationships" xmlns:p="http://schemas.openxmlformats.org/presentationml/2006/main">
   <p:cSld>
     <p:spTree>
@@ -24381,15 +24360,7 @@
             </a:pPr>
             <a:r>
               <a:rPr lang="en-US" dirty="0" smtClean="0"/>
-              <a:t>Try out the Tomcat and </a:t>
-            </a:r>
-            <a:r>
-              <a:rPr lang="en-US" dirty="0" err="1" smtClean="0"/>
-              <a:t>JBoss</a:t>
-            </a:r>
-            <a:r>
-              <a:rPr lang="en-US" dirty="0" smtClean="0"/>
-              <a:t> distribution</a:t>
+              <a:t>Try out the Tomcat and JBoss distribution</a:t>
             </a:r>
           </a:p>
           <a:p>
@@ -24400,15 +24371,7 @@
             </a:pPr>
             <a:r>
               <a:rPr lang="en-US" dirty="0" smtClean="0"/>
-              <a:t>Start </a:t>
-            </a:r>
-            <a:r>
-              <a:rPr lang="en-US" dirty="0" err="1" smtClean="0"/>
-              <a:t>eXo</a:t>
-            </a:r>
-            <a:r>
-              <a:rPr lang="en-US" dirty="0" smtClean="0"/>
-              <a:t> Tomcat in normal mode (not developer mode) on your computer.</a:t>
+              <a:t>Start eXo Tomcat in normal mode (not developer mode) on your computer.</a:t>
             </a:r>
           </a:p>
           <a:p>
@@ -24419,15 +24382,7 @@
             </a:pPr>
             <a:r>
               <a:rPr lang="en-US" dirty="0" smtClean="0"/>
-              <a:t>Prepare a </a:t>
-            </a:r>
-            <a:r>
-              <a:rPr lang="en-US" dirty="0" err="1" smtClean="0"/>
-              <a:t>JBoss</a:t>
-            </a:r>
-            <a:r>
-              <a:rPr lang="en-US" dirty="0" smtClean="0"/>
-              <a:t> installation on your computer.</a:t>
+              <a:t>Prepare a JBoss installation on your computer.</a:t>
             </a:r>
           </a:p>
           <a:p>
@@ -24438,21 +24393,8 @@
             </a:pPr>
             <a:r>
               <a:rPr lang="en-US" dirty="0" smtClean="0"/>
-              <a:t>Run </a:t>
-            </a:r>
-            <a:r>
-              <a:rPr lang="en-US" dirty="0" err="1" smtClean="0"/>
-              <a:t>eXo</a:t>
-            </a:r>
-            <a:r>
-              <a:rPr lang="en-US" dirty="0" smtClean="0"/>
-              <a:t> on </a:t>
-            </a:r>
-            <a:r>
-              <a:rPr lang="en-US" dirty="0" err="1" smtClean="0"/>
-              <a:t>JBoss</a:t>
-            </a:r>
-            <a:endParaRPr lang="en-US" dirty="0" smtClean="0"/>
+              <a:t>Run eXo on JBoss</a:t>
+            </a:r>
           </a:p>
         </p:txBody>
       </p:sp>
@@ -24477,7 +24419,7 @@
 </p:sld>
 </file>
 
-<file path=ppt/slides/slide28.xml><?xml version="1.0" encoding="utf-8"?>
+<file path=ppt/slides/slide29.xml><?xml version="1.0" encoding="utf-8"?>
 <p:sld xmlns:a="http://schemas.openxmlformats.org/drawingml/2006/main" xmlns:r="http://schemas.openxmlformats.org/officeDocument/2006/relationships" xmlns:p="http://schemas.openxmlformats.org/presentationml/2006/main">
   <p:cSld>
     <p:spTree>
@@ -24552,12 +24494,8 @@
               </a:tabLst>
             </a:pPr>
             <a:r>
-              <a:rPr lang="en-US" sz="4800" dirty="0" err="1" smtClean="0"/>
-              <a:t>eXo</a:t>
-            </a:r>
-            <a:r>
               <a:rPr lang="en-US" sz="4800" dirty="0" smtClean="0"/>
-              <a:t> </a:t>
+              <a:t>eXo </a:t>
             </a:r>
             <a:r>
               <a:rPr lang="en-US" sz="4800" dirty="0" err="1" smtClean="0"/>
@@ -24922,6 +24860,9 @@
           <a:lstStyle/>
           <a:p>
             <a:pPr marL="219361" indent="-216749">
+              <a:lnSpc>
+                <a:spcPct val="100000"/>
+              </a:lnSpc>
               <a:buNone/>
             </a:pPr>
             <a:r>
@@ -24931,7 +24872,11 @@
             <a:endParaRPr lang="en-US" dirty="0"/>
           </a:p>
           <a:p>
-            <a:pPr marL="584962" lvl="1" indent="-219361"/>
+            <a:pPr marL="584962" lvl="1" indent="-219361">
+              <a:lnSpc>
+                <a:spcPct val="100000"/>
+              </a:lnSpc>
+            </a:pPr>
             <a:r>
               <a:rPr lang="en-US" dirty="0"/>
               <a:t>http://</a:t>
@@ -24947,6 +24892,9 @@
           </a:p>
           <a:p>
             <a:pPr marL="219361" indent="-216749">
+              <a:lnSpc>
+                <a:spcPct val="100000"/>
+              </a:lnSpc>
               <a:buNone/>
             </a:pPr>
             <a:r>
@@ -24955,10 +24903,33 @@
             </a:r>
           </a:p>
           <a:p>
-            <a:pPr marL="584962" lvl="1" indent="-219361"/>
+            <a:pPr marL="584962" lvl="1" indent="-219361">
+              <a:lnSpc>
+                <a:spcPct val="100000"/>
+              </a:lnSpc>
+            </a:pPr>
+            <a:r>
+              <a:rPr lang="en-US" dirty="0" smtClean="0"/>
+              <a:t>Unzip eXo, you will find the same documentation in</a:t>
+            </a:r>
+          </a:p>
+          <a:p>
+            <a:pPr marL="584962" lvl="1" indent="-219361">
+              <a:lnSpc>
+                <a:spcPct val="100000"/>
+              </a:lnSpc>
+            </a:pPr>
+            <a:r>
+              <a:rPr lang="en-US" dirty="0" smtClean="0"/>
+              <a:t>…</a:t>
+            </a:r>
             <a:r>
               <a:rPr lang="en-US" dirty="0"/>
-              <a:t>…/eXoPlatform-3.0.7/</a:t>
+              <a:t>/eXoPlatform-</a:t>
+            </a:r>
+            <a:r>
+              <a:rPr lang="en-US" dirty="0" smtClean="0"/>
+              <a:t>3.0.6/</a:t>
             </a:r>
             <a:r>
               <a:rPr lang="en-US" dirty="0" smtClean="0"/>
@@ -24967,10 +24938,14 @@
             <a:endParaRPr lang="en-US" dirty="0"/>
           </a:p>
           <a:p>
-            <a:pPr marL="584962" lvl="1" indent="-219361"/>
+            <a:pPr marL="584962" lvl="1" indent="-219361">
+              <a:lnSpc>
+                <a:spcPct val="100000"/>
+              </a:lnSpc>
+            </a:pPr>
             <a:r>
               <a:rPr lang="en-US" dirty="0" smtClean="0"/>
-              <a:t>Once running you can use: http</a:t>
+              <a:t>On a running instance you can also use: http</a:t>
             </a:r>
             <a:r>
               <a:rPr lang="en-US" dirty="0"/>
@@ -24982,18 +24957,35 @@
             </a:r>
           </a:p>
           <a:p>
-            <a:pPr marL="584962" lvl="1" indent="-219361"/>
+            <a:pPr marL="584962" lvl="1" indent="-219361">
+              <a:lnSpc>
+                <a:spcPct val="100000"/>
+              </a:lnSpc>
+            </a:pPr>
             <a:endParaRPr lang="en-US" dirty="0"/>
           </a:p>
           <a:p>
-            <a:pPr marL="584962" lvl="1" indent="-219361"/>
+            <a:pPr marL="584962" lvl="1" indent="-219361">
+              <a:lnSpc>
+                <a:spcPct val="100000"/>
+              </a:lnSpc>
+            </a:pPr>
             <a:r>
               <a:rPr lang="en-US" dirty="0"/>
-              <a:t>Open the Administrator Guide</a:t>
-            </a:r>
-          </a:p>
-          <a:p>
-            <a:pPr marL="584962" lvl="1" indent="-219361"/>
+              <a:t>Open the Administrator </a:t>
+            </a:r>
+            <a:r>
+              <a:rPr lang="en-US" dirty="0" smtClean="0"/>
+              <a:t>Guide. There you find all system administration documentation.</a:t>
+            </a:r>
+            <a:endParaRPr lang="en-US" dirty="0"/>
+          </a:p>
+          <a:p>
+            <a:pPr marL="584962" lvl="1" indent="-219361">
+              <a:lnSpc>
+                <a:spcPct val="100000"/>
+              </a:lnSpc>
+            </a:pPr>
             <a:endParaRPr lang="en-US" dirty="0" smtClean="0"/>
           </a:p>
         </p:txBody>
@@ -25730,29 +25722,28 @@
               <a:t>Adds folders to the existing structure of Tomcat or </a:t>
             </a:r>
             <a:r>
-              <a:rPr lang="en-US" dirty="0" err="1" smtClean="0"/>
-              <a:t>Jboss</a:t>
+              <a:rPr lang="en-US" dirty="0" smtClean="0"/>
+              <a:t>JBoss</a:t>
             </a:r>
             <a:endParaRPr lang="en-US" dirty="0" smtClean="0"/>
           </a:p>
           <a:p>
             <a:pPr marL="584962" lvl="1" indent="-219361"/>
             <a:r>
-              <a:rPr lang="en-US" dirty="0" err="1" smtClean="0"/>
-              <a:t>Gatein</a:t>
-            </a:r>
-            <a:r>
               <a:rPr lang="en-US" dirty="0" smtClean="0"/>
-              <a:t> folder</a:t>
+              <a:t>GateIn </a:t>
+            </a:r>
+            <a:r>
+              <a:rPr lang="en-US" dirty="0" smtClean="0"/>
+              <a:t>folder</a:t>
             </a:r>
           </a:p>
           <a:p>
             <a:pPr marL="584962" lvl="1" indent="-219361"/>
             <a:r>
-              <a:rPr lang="en-US" dirty="0" err="1" smtClean="0"/>
+              <a:rPr lang="en-US" dirty="0" smtClean="0"/>
               <a:t>Lucene</a:t>
             </a:r>
-            <a:endParaRPr lang="en-US" dirty="0" smtClean="0"/>
           </a:p>
           <a:p>
             <a:pPr marL="584962" lvl="1" indent="-219361"/>
@@ -25771,7 +25762,7 @@
           <a:p>
             <a:pPr marL="584962" lvl="1" indent="-219361"/>
             <a:r>
-              <a:rPr lang="en-US" smtClean="0"/>
+              <a:rPr lang="en-US" dirty="0" smtClean="0"/>
               <a:t>Swap</a:t>
             </a:r>
             <a:endParaRPr lang="en-US" dirty="0"/>

</xml_diff>